<commit_message>
poster e press release
</commit_message>
<xml_diff>
--- a/05. Apresentações/s28-Poster.pptx
+++ b/05. Apresentações/s28-Poster.pptx
@@ -15,6 +15,9 @@
   </p:sldIdLst>
   <p:sldSz cx="26670000" cy="38100000"/>
   <p:notesSz cx="6858000" cy="9144000"/>
+  <p:custDataLst>
+    <p:tags r:id="rId5"/>
+  </p:custDataLst>
   <p:defaultTextStyle>
     <a:defPPr>
       <a:defRPr lang="pt-BR"/>
@@ -797,6 +800,22 @@
   <p:clrMapOvr>
     <a:masterClrMapping/>
   </p:clrMapOvr>
+  <p:extLst>
+    <p:ext uri="{DCECCB84-F9BA-43D5-87BE-67443E8EF086}">
+      <p15:sldGuideLst xmlns:p15="http://schemas.microsoft.com/office/powerpoint/2012/main">
+        <p15:guide id="1" orient="horz" pos="12000" userDrawn="1">
+          <p15:clr>
+            <a:srgbClr val="FBAE40"/>
+          </p15:clr>
+        </p15:guide>
+        <p15:guide id="2" pos="8400" userDrawn="1">
+          <p15:clr>
+            <a:srgbClr val="FBAE40"/>
+          </p15:clr>
+        </p15:guide>
+      </p15:sldGuideLst>
+    </p:ext>
+  </p:extLst>
 </p:sldLayout>
 </file>
 
@@ -825,6 +844,72 @@
           <a:chExt cx="0" cy="0"/>
         </a:xfrm>
       </p:grpSpPr>
+      <p:graphicFrame>
+        <p:nvGraphicFramePr>
+          <p:cNvPr id="6" name="think-cell data - do not delete" hidden="1">
+            <a:extLst>
+              <a:ext uri="{FF2B5EF4-FFF2-40B4-BE49-F238E27FC236}">
+                <a16:creationId xmlns:a16="http://schemas.microsoft.com/office/drawing/2014/main" id="{878BC8B4-4CB3-7D09-68BA-BDE98D824C32}"/>
+              </a:ext>
+            </a:extLst>
+          </p:cNvPr>
+          <p:cNvGraphicFramePr>
+            <a:graphicFrameLocks noChangeAspect="1"/>
+          </p:cNvGraphicFramePr>
+          <p:nvPr userDrawn="1">
+            <p:custDataLst>
+              <p:tags r:id="rId3"/>
+            </p:custDataLst>
+            <p:extLst>
+              <p:ext uri="{D42A27DB-BD31-4B8C-83A1-F6EECF244321}">
+                <p14:modId xmlns:p14="http://schemas.microsoft.com/office/powerpoint/2010/main" val="3678770162"/>
+              </p:ext>
+            </p:extLst>
+          </p:nvPr>
+        </p:nvGraphicFramePr>
+        <p:xfrm>
+          <a:off x="1588" y="1588"/>
+          <a:ext cx="1588" cy="1588"/>
+        </p:xfrm>
+        <a:graphic>
+          <a:graphicData uri="http://schemas.openxmlformats.org/presentationml/2006/ole">
+            <mc:AlternateContent xmlns:mc="http://schemas.openxmlformats.org/markup-compatibility/2006">
+              <mc:Choice xmlns:v="urn:schemas-microsoft-com:vml" Requires="v">
+                <p:oleObj name="Slide do think-cell" r:id="rId4" imgW="473" imgH="476" progId="TCLayout.ActiveDocument.1">
+                  <p:embed/>
+                </p:oleObj>
+              </mc:Choice>
+              <mc:Fallback>
+                <p:oleObj name="Slide do think-cell" r:id="rId4" imgW="473" imgH="476" progId="TCLayout.ActiveDocument.1">
+                  <p:embed/>
+                  <p:pic>
+                    <p:nvPicPr>
+                      <p:cNvPr id="0" name=""/>
+                      <p:cNvPicPr/>
+                      <p:nvPr/>
+                    </p:nvPicPr>
+                    <p:blipFill>
+                      <a:blip r:embed="rId5"/>
+                      <a:stretch>
+                        <a:fillRect/>
+                      </a:stretch>
+                    </p:blipFill>
+                    <p:spPr>
+                      <a:xfrm>
+                        <a:off x="1588" y="1588"/>
+                        <a:ext cx="1588" cy="1588"/>
+                      </a:xfrm>
+                      <a:prstGeom prst="rect">
+                        <a:avLst/>
+                      </a:prstGeom>
+                    </p:spPr>
+                  </p:pic>
+                </p:oleObj>
+              </mc:Fallback>
+            </mc:AlternateContent>
+          </a:graphicData>
+        </a:graphic>
+      </p:graphicFrame>
       <p:grpSp>
         <p:nvGrpSpPr>
           <p:cNvPr id="1038" name="Group 14"/>
@@ -850,7 +935,7 @@
             <p:nvPr userDrawn="1"/>
           </p:nvPicPr>
           <p:blipFill>
-            <a:blip r:embed="rId3">
+            <a:blip r:embed="rId6">
               <a:extLst>
                 <a:ext uri="{28A0092B-C50C-407E-A947-70E740481C1C}">
                   <a14:useLocalDpi xmlns:a14="http://schemas.microsoft.com/office/drawing/2010/main" val="0"/>
@@ -1016,23 +1101,8 @@
                   </a:solidFill>
                   <a:latin typeface="Berlin Sans FB Demi" pitchFamily="34" charset="0"/>
                 </a:rPr>
-                <a:t>Projeto de Formatura </a:t>
+                <a:t>Projeto de Formatura – 2023</a:t>
               </a:r>
-              <a:r>
-                <a:rPr lang="pt-BR" altLang="pt-BR" sz="7200">
-                  <a:solidFill>
-                    <a:srgbClr val="6600FF"/>
-                  </a:solidFill>
-                  <a:latin typeface="Berlin Sans FB Demi" pitchFamily="34" charset="0"/>
-                </a:rPr>
-                <a:t>– 2023</a:t>
-              </a:r>
-              <a:endParaRPr lang="pt-BR" altLang="pt-BR" sz="7200" dirty="0">
-                <a:solidFill>
-                  <a:srgbClr val="6600FF"/>
-                </a:solidFill>
-                <a:latin typeface="Berlin Sans FB Demi" pitchFamily="34" charset="0"/>
-              </a:endParaRPr>
             </a:p>
             <a:p>
               <a:pPr algn="ctr">
@@ -1107,7 +1177,7 @@
             <a:p>
               <a:pPr algn="ctr"/>
               <a:r>
-                <a:rPr lang="pt-BR" altLang="pt-BR" sz="5400">
+                <a:rPr lang="pt-BR" altLang="pt-BR" sz="5400" dirty="0">
                   <a:latin typeface="Berlin Sans FB Demi" pitchFamily="34" charset="0"/>
                 </a:rPr>
                 <a:t>Engenharia Elétrica – Ênfase Computação</a:t>
@@ -1488,6 +1558,22 @@
       </a:lvl9pPr>
     </p:otherStyle>
   </p:txStyles>
+  <p:extLst>
+    <p:ext uri="{27BBF7A9-308A-43DC-89C8-2F10F3537804}">
+      <p15:sldGuideLst xmlns:p15="http://schemas.microsoft.com/office/powerpoint/2012/main">
+        <p15:guide id="1" orient="horz" pos="12000" userDrawn="1">
+          <p15:clr>
+            <a:srgbClr val="F26B43"/>
+          </p15:clr>
+        </p15:guide>
+        <p15:guide id="2" pos="8400" userDrawn="1">
+          <p15:clr>
+            <a:srgbClr val="F26B43"/>
+          </p15:clr>
+        </p15:guide>
+      </p15:sldGuideLst>
+    </p:ext>
+  </p:extLst>
 </p:sldMaster>
 </file>
 
@@ -1508,6 +1594,124 @@
           <a:chExt cx="0" cy="0"/>
         </a:xfrm>
       </p:grpSpPr>
+      <p:graphicFrame>
+        <p:nvGraphicFramePr>
+          <p:cNvPr id="33" name="think-cell data - do not delete" hidden="1">
+            <a:extLst>
+              <a:ext uri="{FF2B5EF4-FFF2-40B4-BE49-F238E27FC236}">
+                <a16:creationId xmlns:a16="http://schemas.microsoft.com/office/drawing/2014/main" id="{F4ADA71E-0301-9F45-9578-945ECAFB2238}"/>
+              </a:ext>
+            </a:extLst>
+          </p:cNvPr>
+          <p:cNvGraphicFramePr>
+            <a:graphicFrameLocks noChangeAspect="1"/>
+          </p:cNvGraphicFramePr>
+          <p:nvPr>
+            <p:custDataLst>
+              <p:tags r:id="rId1"/>
+            </p:custDataLst>
+            <p:extLst>
+              <p:ext uri="{D42A27DB-BD31-4B8C-83A1-F6EECF244321}">
+                <p14:modId xmlns:p14="http://schemas.microsoft.com/office/powerpoint/2010/main" val="583697147"/>
+              </p:ext>
+            </p:extLst>
+          </p:nvPr>
+        </p:nvGraphicFramePr>
+        <p:xfrm>
+          <a:off x="1588" y="1588"/>
+          <a:ext cx="1588" cy="1588"/>
+        </p:xfrm>
+        <a:graphic>
+          <a:graphicData uri="http://schemas.openxmlformats.org/presentationml/2006/ole">
+            <mc:AlternateContent xmlns:mc="http://schemas.openxmlformats.org/markup-compatibility/2006">
+              <mc:Choice xmlns:v="urn:schemas-microsoft-com:vml" Requires="v">
+                <p:oleObj name="Slide do think-cell" r:id="rId4" imgW="473" imgH="476" progId="TCLayout.ActiveDocument.1">
+                  <p:embed/>
+                </p:oleObj>
+              </mc:Choice>
+              <mc:Fallback>
+                <p:oleObj name="Slide do think-cell" r:id="rId4" imgW="473" imgH="476" progId="TCLayout.ActiveDocument.1">
+                  <p:embed/>
+                  <p:pic>
+                    <p:nvPicPr>
+                      <p:cNvPr id="0" name=""/>
+                      <p:cNvPicPr/>
+                      <p:nvPr/>
+                    </p:nvPicPr>
+                    <p:blipFill>
+                      <a:blip r:embed="rId5"/>
+                      <a:stretch>
+                        <a:fillRect/>
+                      </a:stretch>
+                    </p:blipFill>
+                    <p:spPr>
+                      <a:xfrm>
+                        <a:off x="1588" y="1588"/>
+                        <a:ext cx="1588" cy="1588"/>
+                      </a:xfrm>
+                      <a:prstGeom prst="rect">
+                        <a:avLst/>
+                      </a:prstGeom>
+                    </p:spPr>
+                  </p:pic>
+                </p:oleObj>
+              </mc:Fallback>
+            </mc:AlternateContent>
+          </a:graphicData>
+        </a:graphic>
+      </p:graphicFrame>
+      <p:sp>
+        <p:nvSpPr>
+          <p:cNvPr id="32" name="Retângulo 31">
+            <a:extLst>
+              <a:ext uri="{FF2B5EF4-FFF2-40B4-BE49-F238E27FC236}">
+                <a16:creationId xmlns:a16="http://schemas.microsoft.com/office/drawing/2014/main" id="{E73D3804-A502-B50D-E428-D17B75ECDEF7}"/>
+              </a:ext>
+            </a:extLst>
+          </p:cNvPr>
+          <p:cNvSpPr/>
+          <p:nvPr/>
+        </p:nvSpPr>
+        <p:spPr>
+          <a:xfrm>
+            <a:off x="1309688" y="36386631"/>
+            <a:ext cx="24266525" cy="1379244"/>
+          </a:xfrm>
+          <a:prstGeom prst="rect">
+            <a:avLst/>
+          </a:prstGeom>
+          <a:solidFill>
+            <a:srgbClr val="E2ECE4"/>
+          </a:solidFill>
+          <a:ln>
+            <a:noFill/>
+          </a:ln>
+        </p:spPr>
+        <p:style>
+          <a:lnRef idx="2">
+            <a:schemeClr val="accent1">
+              <a:shade val="15000"/>
+            </a:schemeClr>
+          </a:lnRef>
+          <a:fillRef idx="1">
+            <a:schemeClr val="accent1"/>
+          </a:fillRef>
+          <a:effectRef idx="0">
+            <a:schemeClr val="accent1"/>
+          </a:effectRef>
+          <a:fontRef idx="minor">
+            <a:schemeClr val="lt1"/>
+          </a:fontRef>
+        </p:style>
+        <p:txBody>
+          <a:bodyPr rtlCol="0" anchor="ctr"/>
+          <a:lstStyle/>
+          <a:p>
+            <a:pPr algn="ctr"/>
+            <a:endParaRPr lang="pt-BR"/>
+          </a:p>
+        </p:txBody>
+      </p:sp>
       <p:sp>
         <p:nvSpPr>
           <p:cNvPr id="3" name="TextBox 12"/>
@@ -1517,7 +1721,7 @@
         <p:spPr>
           <a:xfrm>
             <a:off x="1524001" y="6088560"/>
-            <a:ext cx="23836335" cy="707886"/>
+            <a:ext cx="23836335" cy="923330"/>
           </a:xfrm>
           <a:prstGeom prst="rect">
             <a:avLst/>
@@ -1644,551 +1848,15 @@
               <a:defRPr/>
             </a:pPr>
             <a:r>
-              <a:rPr lang="pt-BR" sz="4000" b="1" dirty="0" smtClean="0">
+              <a:rPr lang="pt-BR" sz="5400" dirty="0">
                 <a:solidFill>
                   <a:srgbClr val="6600FF"/>
                 </a:solidFill>
-                <a:latin typeface="Tahoma"/>
+                <a:latin typeface="Berlin Sans FB" panose="020E0602020502020306" pitchFamily="34" charset="0"/>
                 <a:ea typeface="Times New Roman"/>
               </a:rPr>
-              <a:t>Explorando Padrões </a:t>
-            </a:r>
-            <a:r>
-              <a:rPr lang="pt-BR" sz="4000" b="1" dirty="0">
-                <a:solidFill>
-                  <a:srgbClr val="6600FF"/>
-                </a:solidFill>
-                <a:latin typeface="Tahoma"/>
-                <a:ea typeface="Times New Roman"/>
-              </a:rPr>
-              <a:t>e Tendências de Mortalidade no </a:t>
-            </a:r>
-            <a:r>
-              <a:rPr lang="pt-BR" sz="4000" b="1" dirty="0" smtClean="0">
-                <a:solidFill>
-                  <a:srgbClr val="6600FF"/>
-                </a:solidFill>
-                <a:latin typeface="Tahoma"/>
-                <a:ea typeface="Times New Roman"/>
-              </a:rPr>
-              <a:t>Brasil, com </a:t>
-            </a:r>
-            <a:r>
-              <a:rPr lang="pt-BR" sz="4000" b="1" dirty="0">
-                <a:solidFill>
-                  <a:srgbClr val="6600FF"/>
-                </a:solidFill>
-                <a:latin typeface="Tahoma"/>
-                <a:ea typeface="Times New Roman"/>
-              </a:rPr>
-              <a:t>Aprendizado de </a:t>
-            </a:r>
-            <a:r>
-              <a:rPr lang="pt-BR" sz="4000" b="1" dirty="0" smtClean="0">
-                <a:solidFill>
-                  <a:srgbClr val="6600FF"/>
-                </a:solidFill>
-                <a:latin typeface="Tahoma"/>
-                <a:ea typeface="Times New Roman"/>
-              </a:rPr>
-              <a:t>Máquina</a:t>
-            </a:r>
-            <a:endParaRPr lang="pt-BR" sz="4000" b="1" dirty="0">
-              <a:solidFill>
-                <a:srgbClr val="6600FF"/>
-              </a:solidFill>
-              <a:latin typeface="Tahoma"/>
-              <a:ea typeface="Times New Roman"/>
-            </a:endParaRPr>
-          </a:p>
-        </p:txBody>
-      </p:sp>
-      <p:sp>
-        <p:nvSpPr>
-          <p:cNvPr id="4" name="TextBox 8"/>
-          <p:cNvSpPr txBox="1"/>
-          <p:nvPr/>
-        </p:nvSpPr>
-        <p:spPr>
-          <a:xfrm>
-            <a:off x="3636963" y="36386631"/>
-            <a:ext cx="7885112" cy="677108"/>
-          </a:xfrm>
-          <a:prstGeom prst="rect">
-            <a:avLst/>
-          </a:prstGeom>
-          <a:noFill/>
-        </p:spPr>
-        <p:txBody>
-          <a:bodyPr>
-            <a:spAutoFit/>
-          </a:bodyPr>
-          <a:lstStyle>
-            <a:lvl1pPr eaLnBrk="0" hangingPunct="0">
-              <a:defRPr sz="2400">
-                <a:solidFill>
-                  <a:schemeClr val="tx1"/>
-                </a:solidFill>
-                <a:latin typeface="Times New Roman" charset="0"/>
-                <a:ea typeface="ＭＳ Ｐゴシック" charset="0"/>
-                <a:cs typeface="Arial" charset="0"/>
-              </a:defRPr>
-            </a:lvl1pPr>
-            <a:lvl2pPr marL="742950" indent="-285750" eaLnBrk="0" hangingPunct="0">
-              <a:defRPr sz="2400">
-                <a:solidFill>
-                  <a:schemeClr val="tx1"/>
-                </a:solidFill>
-                <a:latin typeface="Times New Roman" charset="0"/>
-                <a:ea typeface="Arial" charset="0"/>
-                <a:cs typeface="Arial" charset="0"/>
-              </a:defRPr>
-            </a:lvl2pPr>
-            <a:lvl3pPr marL="1143000" indent="-228600" eaLnBrk="0" hangingPunct="0">
-              <a:defRPr sz="2400">
-                <a:solidFill>
-                  <a:schemeClr val="tx1"/>
-                </a:solidFill>
-                <a:latin typeface="Times New Roman" charset="0"/>
-                <a:ea typeface="Arial" charset="0"/>
-                <a:cs typeface="Arial" charset="0"/>
-              </a:defRPr>
-            </a:lvl3pPr>
-            <a:lvl4pPr marL="1600200" indent="-228600" eaLnBrk="0" hangingPunct="0">
-              <a:defRPr sz="2400">
-                <a:solidFill>
-                  <a:schemeClr val="tx1"/>
-                </a:solidFill>
-                <a:latin typeface="Times New Roman" charset="0"/>
-                <a:ea typeface="Arial" charset="0"/>
-                <a:cs typeface="Arial" charset="0"/>
-              </a:defRPr>
-            </a:lvl4pPr>
-            <a:lvl5pPr marL="2057400" indent="-228600" eaLnBrk="0" hangingPunct="0">
-              <a:defRPr sz="2400">
-                <a:solidFill>
-                  <a:schemeClr val="tx1"/>
-                </a:solidFill>
-                <a:latin typeface="Times New Roman" charset="0"/>
-                <a:ea typeface="Arial" charset="0"/>
-                <a:cs typeface="Arial" charset="0"/>
-              </a:defRPr>
-            </a:lvl5pPr>
-            <a:lvl6pPr marL="2514600" indent="-228600" eaLnBrk="0" fontAlgn="base" hangingPunct="0">
-              <a:spcBef>
-                <a:spcPct val="0"/>
-              </a:spcBef>
-              <a:spcAft>
-                <a:spcPct val="0"/>
-              </a:spcAft>
-              <a:defRPr sz="2400">
-                <a:solidFill>
-                  <a:schemeClr val="tx1"/>
-                </a:solidFill>
-                <a:latin typeface="Times New Roman" charset="0"/>
-                <a:ea typeface="Arial" charset="0"/>
-                <a:cs typeface="Arial" charset="0"/>
-              </a:defRPr>
-            </a:lvl6pPr>
-            <a:lvl7pPr marL="2971800" indent="-228600" eaLnBrk="0" fontAlgn="base" hangingPunct="0">
-              <a:spcBef>
-                <a:spcPct val="0"/>
-              </a:spcBef>
-              <a:spcAft>
-                <a:spcPct val="0"/>
-              </a:spcAft>
-              <a:defRPr sz="2400">
-                <a:solidFill>
-                  <a:schemeClr val="tx1"/>
-                </a:solidFill>
-                <a:latin typeface="Times New Roman" charset="0"/>
-                <a:ea typeface="Arial" charset="0"/>
-                <a:cs typeface="Arial" charset="0"/>
-              </a:defRPr>
-            </a:lvl7pPr>
-            <a:lvl8pPr marL="3429000" indent="-228600" eaLnBrk="0" fontAlgn="base" hangingPunct="0">
-              <a:spcBef>
-                <a:spcPct val="0"/>
-              </a:spcBef>
-              <a:spcAft>
-                <a:spcPct val="0"/>
-              </a:spcAft>
-              <a:defRPr sz="2400">
-                <a:solidFill>
-                  <a:schemeClr val="tx1"/>
-                </a:solidFill>
-                <a:latin typeface="Times New Roman" charset="0"/>
-                <a:ea typeface="Arial" charset="0"/>
-                <a:cs typeface="Arial" charset="0"/>
-              </a:defRPr>
-            </a:lvl8pPr>
-            <a:lvl9pPr marL="3886200" indent="-228600" eaLnBrk="0" fontAlgn="base" hangingPunct="0">
-              <a:spcBef>
-                <a:spcPct val="0"/>
-              </a:spcBef>
-              <a:spcAft>
-                <a:spcPct val="0"/>
-              </a:spcAft>
-              <a:defRPr sz="2400">
-                <a:solidFill>
-                  <a:schemeClr val="tx1"/>
-                </a:solidFill>
-                <a:latin typeface="Times New Roman" charset="0"/>
-                <a:ea typeface="Arial" charset="0"/>
-                <a:cs typeface="Arial" charset="0"/>
-              </a:defRPr>
-            </a:lvl9pPr>
-          </a:lstStyle>
-          <a:p>
-            <a:pPr eaLnBrk="1" hangingPunct="1">
-              <a:defRPr/>
-            </a:pPr>
-            <a:r>
-              <a:rPr lang="en-US" sz="3800" dirty="0" smtClean="0">
-                <a:latin typeface="Tahoma" pitchFamily="34" charset="0"/>
-                <a:ea typeface="Tahoma" pitchFamily="34" charset="0"/>
-                <a:cs typeface="Tahoma" pitchFamily="34" charset="0"/>
-              </a:rPr>
-              <a:t>Filipe Penna </a:t>
-            </a:r>
-            <a:r>
-              <a:rPr lang="en-US" sz="3800" dirty="0" err="1" smtClean="0">
-                <a:latin typeface="Tahoma" pitchFamily="34" charset="0"/>
-                <a:ea typeface="Tahoma" pitchFamily="34" charset="0"/>
-                <a:cs typeface="Tahoma" pitchFamily="34" charset="0"/>
-              </a:rPr>
-              <a:t>Cerávolo</a:t>
-            </a:r>
-            <a:r>
-              <a:rPr lang="en-US" sz="3800" dirty="0" smtClean="0">
-                <a:latin typeface="Tahoma" pitchFamily="34" charset="0"/>
-                <a:ea typeface="Tahoma" pitchFamily="34" charset="0"/>
-                <a:cs typeface="Tahoma" pitchFamily="34" charset="0"/>
-              </a:rPr>
-              <a:t> Soares </a:t>
-            </a:r>
-            <a:endParaRPr lang="en-US" sz="3800" dirty="0">
-              <a:latin typeface="Tahoma" pitchFamily="34" charset="0"/>
-              <a:ea typeface="Tahoma" pitchFamily="34" charset="0"/>
-              <a:cs typeface="Tahoma" pitchFamily="34" charset="0"/>
-            </a:endParaRPr>
-          </a:p>
-        </p:txBody>
-      </p:sp>
-      <p:sp>
-        <p:nvSpPr>
-          <p:cNvPr id="5" name="TextBox 9"/>
-          <p:cNvSpPr txBox="1"/>
-          <p:nvPr/>
-        </p:nvSpPr>
-        <p:spPr>
-          <a:xfrm>
-            <a:off x="6926263" y="37089600"/>
-            <a:ext cx="7596187" cy="676275"/>
-          </a:xfrm>
-          <a:prstGeom prst="rect">
-            <a:avLst/>
-          </a:prstGeom>
-          <a:noFill/>
-        </p:spPr>
-        <p:txBody>
-          <a:bodyPr>
-            <a:spAutoFit/>
-          </a:bodyPr>
-          <a:lstStyle>
-            <a:lvl1pPr eaLnBrk="0" hangingPunct="0">
-              <a:defRPr sz="2400">
-                <a:solidFill>
-                  <a:schemeClr val="tx1"/>
-                </a:solidFill>
-                <a:latin typeface="Times New Roman" charset="0"/>
-                <a:ea typeface="ＭＳ Ｐゴシック" charset="0"/>
-                <a:cs typeface="Arial" charset="0"/>
-              </a:defRPr>
-            </a:lvl1pPr>
-            <a:lvl2pPr marL="742950" indent="-285750" eaLnBrk="0" hangingPunct="0">
-              <a:defRPr sz="2400">
-                <a:solidFill>
-                  <a:schemeClr val="tx1"/>
-                </a:solidFill>
-                <a:latin typeface="Times New Roman" charset="0"/>
-                <a:ea typeface="Arial" charset="0"/>
-                <a:cs typeface="Arial" charset="0"/>
-              </a:defRPr>
-            </a:lvl2pPr>
-            <a:lvl3pPr marL="1143000" indent="-228600" eaLnBrk="0" hangingPunct="0">
-              <a:defRPr sz="2400">
-                <a:solidFill>
-                  <a:schemeClr val="tx1"/>
-                </a:solidFill>
-                <a:latin typeface="Times New Roman" charset="0"/>
-                <a:ea typeface="Arial" charset="0"/>
-                <a:cs typeface="Arial" charset="0"/>
-              </a:defRPr>
-            </a:lvl3pPr>
-            <a:lvl4pPr marL="1600200" indent="-228600" eaLnBrk="0" hangingPunct="0">
-              <a:defRPr sz="2400">
-                <a:solidFill>
-                  <a:schemeClr val="tx1"/>
-                </a:solidFill>
-                <a:latin typeface="Times New Roman" charset="0"/>
-                <a:ea typeface="Arial" charset="0"/>
-                <a:cs typeface="Arial" charset="0"/>
-              </a:defRPr>
-            </a:lvl4pPr>
-            <a:lvl5pPr marL="2057400" indent="-228600" eaLnBrk="0" hangingPunct="0">
-              <a:defRPr sz="2400">
-                <a:solidFill>
-                  <a:schemeClr val="tx1"/>
-                </a:solidFill>
-                <a:latin typeface="Times New Roman" charset="0"/>
-                <a:ea typeface="Arial" charset="0"/>
-                <a:cs typeface="Arial" charset="0"/>
-              </a:defRPr>
-            </a:lvl5pPr>
-            <a:lvl6pPr marL="2514600" indent="-228600" eaLnBrk="0" fontAlgn="base" hangingPunct="0">
-              <a:spcBef>
-                <a:spcPct val="0"/>
-              </a:spcBef>
-              <a:spcAft>
-                <a:spcPct val="0"/>
-              </a:spcAft>
-              <a:defRPr sz="2400">
-                <a:solidFill>
-                  <a:schemeClr val="tx1"/>
-                </a:solidFill>
-                <a:latin typeface="Times New Roman" charset="0"/>
-                <a:ea typeface="Arial" charset="0"/>
-                <a:cs typeface="Arial" charset="0"/>
-              </a:defRPr>
-            </a:lvl6pPr>
-            <a:lvl7pPr marL="2971800" indent="-228600" eaLnBrk="0" fontAlgn="base" hangingPunct="0">
-              <a:spcBef>
-                <a:spcPct val="0"/>
-              </a:spcBef>
-              <a:spcAft>
-                <a:spcPct val="0"/>
-              </a:spcAft>
-              <a:defRPr sz="2400">
-                <a:solidFill>
-                  <a:schemeClr val="tx1"/>
-                </a:solidFill>
-                <a:latin typeface="Times New Roman" charset="0"/>
-                <a:ea typeface="Arial" charset="0"/>
-                <a:cs typeface="Arial" charset="0"/>
-              </a:defRPr>
-            </a:lvl7pPr>
-            <a:lvl8pPr marL="3429000" indent="-228600" eaLnBrk="0" fontAlgn="base" hangingPunct="0">
-              <a:spcBef>
-                <a:spcPct val="0"/>
-              </a:spcBef>
-              <a:spcAft>
-                <a:spcPct val="0"/>
-              </a:spcAft>
-              <a:defRPr sz="2400">
-                <a:solidFill>
-                  <a:schemeClr val="tx1"/>
-                </a:solidFill>
-                <a:latin typeface="Times New Roman" charset="0"/>
-                <a:ea typeface="Arial" charset="0"/>
-                <a:cs typeface="Arial" charset="0"/>
-              </a:defRPr>
-            </a:lvl8pPr>
-            <a:lvl9pPr marL="3886200" indent="-228600" eaLnBrk="0" fontAlgn="base" hangingPunct="0">
-              <a:spcBef>
-                <a:spcPct val="0"/>
-              </a:spcBef>
-              <a:spcAft>
-                <a:spcPct val="0"/>
-              </a:spcAft>
-              <a:defRPr sz="2400">
-                <a:solidFill>
-                  <a:schemeClr val="tx1"/>
-                </a:solidFill>
-                <a:latin typeface="Times New Roman" charset="0"/>
-                <a:ea typeface="Arial" charset="0"/>
-                <a:cs typeface="Arial" charset="0"/>
-              </a:defRPr>
-            </a:lvl9pPr>
-          </a:lstStyle>
-          <a:p>
-            <a:pPr eaLnBrk="1" hangingPunct="1">
-              <a:defRPr/>
-            </a:pPr>
-            <a:r>
-              <a:rPr lang="pt-BR" sz="3800" dirty="0" smtClean="0">
-                <a:latin typeface="Tahoma" pitchFamily="34" charset="0"/>
-                <a:ea typeface="Tahoma" pitchFamily="34" charset="0"/>
-                <a:cs typeface="Tahoma" pitchFamily="34" charset="0"/>
-              </a:rPr>
-              <a:t>Prof. Dr. Arthur Jordão</a:t>
-            </a:r>
-            <a:endParaRPr lang="pt-BR" sz="3800" dirty="0">
-              <a:latin typeface="Tahoma" pitchFamily="34" charset="0"/>
-              <a:ea typeface="Tahoma" pitchFamily="34" charset="0"/>
-              <a:cs typeface="Tahoma" pitchFamily="34" charset="0"/>
-            </a:endParaRPr>
-          </a:p>
-        </p:txBody>
-      </p:sp>
-      <p:sp>
-        <p:nvSpPr>
-          <p:cNvPr id="7" name="Text Box 10"/>
-          <p:cNvSpPr txBox="1">
-            <a:spLocks noChangeArrowheads="1"/>
-          </p:cNvSpPr>
-          <p:nvPr/>
-        </p:nvSpPr>
-        <p:spPr bwMode="auto">
-          <a:xfrm>
-            <a:off x="588963" y="36448250"/>
-            <a:ext cx="3048000" cy="641350"/>
-          </a:xfrm>
-          <a:prstGeom prst="rect">
-            <a:avLst/>
-          </a:prstGeom>
-          <a:noFill/>
-          <a:ln>
-            <a:noFill/>
-          </a:ln>
-          <a:effectLst/>
-          <a:extLst>
-            <a:ext uri="{909E8E84-426E-40DD-AFC4-6F175D3DCCD1}">
-              <a14:hiddenFill xmlns:a14="http://schemas.microsoft.com/office/drawing/2010/main">
-                <a:solidFill>
-                  <a:schemeClr val="accent1"/>
-                </a:solidFill>
-              </a14:hiddenFill>
-            </a:ext>
-            <a:ext uri="{91240B29-F687-4F45-9708-019B960494DF}">
-              <a14:hiddenLine xmlns:a14="http://schemas.microsoft.com/office/drawing/2010/main" w="9525">
-                <a:solidFill>
-                  <a:schemeClr val="tx1"/>
-                </a:solidFill>
-                <a:miter lim="800000"/>
-                <a:headEnd/>
-                <a:tailEnd/>
-              </a14:hiddenLine>
-            </a:ext>
-            <a:ext uri="{AF507438-7753-43E0-B8FC-AC1667EBCBE1}">
-              <a14:hiddenEffects xmlns:a14="http://schemas.microsoft.com/office/drawing/2010/main">
-                <a:effectLst>
-                  <a:outerShdw dist="35921" dir="2700000" algn="ctr" rotWithShape="0">
-                    <a:schemeClr val="bg2"/>
-                  </a:outerShdw>
-                </a:effectLst>
-              </a14:hiddenEffects>
-            </a:ext>
-          </a:extLst>
-        </p:spPr>
-        <p:txBody>
-          <a:bodyPr>
-            <a:spAutoFit/>
-          </a:bodyPr>
-          <a:lstStyle/>
-          <a:p>
-            <a:pPr>
-              <a:lnSpc>
-                <a:spcPct val="90000"/>
-              </a:lnSpc>
-            </a:pPr>
-            <a:r>
-              <a:rPr lang="pt-BR" altLang="pt-BR" sz="4000" dirty="0">
-                <a:solidFill>
-                  <a:srgbClr val="6600FF"/>
-                </a:solidFill>
-                <a:latin typeface="Tahoma" pitchFamily="34" charset="0"/>
-              </a:rPr>
-              <a:t>Integrantes:</a:t>
-            </a:r>
-          </a:p>
-        </p:txBody>
-      </p:sp>
-      <p:sp>
-        <p:nvSpPr>
-          <p:cNvPr id="8" name="Text Box 11"/>
-          <p:cNvSpPr txBox="1">
-            <a:spLocks noChangeArrowheads="1"/>
-          </p:cNvSpPr>
-          <p:nvPr/>
-        </p:nvSpPr>
-        <p:spPr bwMode="auto">
-          <a:xfrm>
-            <a:off x="588963" y="37141322"/>
-            <a:ext cx="6337300" cy="646331"/>
-          </a:xfrm>
-          <a:prstGeom prst="rect">
-            <a:avLst/>
-          </a:prstGeom>
-          <a:noFill/>
-          <a:ln>
-            <a:noFill/>
-          </a:ln>
-          <a:effectLst/>
-          <a:extLst>
-            <a:ext uri="{909E8E84-426E-40DD-AFC4-6F175D3DCCD1}">
-              <a14:hiddenFill xmlns:a14="http://schemas.microsoft.com/office/drawing/2010/main">
-                <a:solidFill>
-                  <a:schemeClr val="accent1"/>
-                </a:solidFill>
-              </a14:hiddenFill>
-            </a:ext>
-            <a:ext uri="{91240B29-F687-4F45-9708-019B960494DF}">
-              <a14:hiddenLine xmlns:a14="http://schemas.microsoft.com/office/drawing/2010/main" w="9525">
-                <a:solidFill>
-                  <a:schemeClr val="tx1"/>
-                </a:solidFill>
-                <a:miter lim="800000"/>
-                <a:headEnd/>
-                <a:tailEnd/>
-              </a14:hiddenLine>
-            </a:ext>
-            <a:ext uri="{AF507438-7753-43E0-B8FC-AC1667EBCBE1}">
-              <a14:hiddenEffects xmlns:a14="http://schemas.microsoft.com/office/drawing/2010/main">
-                <a:effectLst>
-                  <a:outerShdw dist="35921" dir="2700000" algn="ctr" rotWithShape="0">
-                    <a:schemeClr val="bg2"/>
-                  </a:outerShdw>
-                </a:effectLst>
-              </a14:hiddenEffects>
-            </a:ext>
-          </a:extLst>
-        </p:spPr>
-        <p:txBody>
-          <a:bodyPr wrap="square">
-            <a:spAutoFit/>
-          </a:bodyPr>
-          <a:lstStyle/>
-          <a:p>
-            <a:pPr>
-              <a:lnSpc>
-                <a:spcPct val="90000"/>
-              </a:lnSpc>
-            </a:pPr>
-            <a:r>
-              <a:rPr lang="pt-BR" altLang="pt-BR" sz="4000" dirty="0">
-                <a:solidFill>
-                  <a:srgbClr val="6600FF"/>
-                </a:solidFill>
-                <a:latin typeface="Tahoma" pitchFamily="34" charset="0"/>
-              </a:rPr>
-              <a:t>Professor(a) Orientador(a</a:t>
-            </a:r>
-            <a:r>
-              <a:rPr lang="pt-BR" altLang="pt-BR" sz="4000" dirty="0" smtClean="0">
-                <a:solidFill>
-                  <a:srgbClr val="6600FF"/>
-                </a:solidFill>
-                <a:latin typeface="Tahoma" pitchFamily="34" charset="0"/>
-              </a:rPr>
-              <a:t>):</a:t>
-            </a:r>
-            <a:endParaRPr lang="pt-BR" altLang="pt-BR" sz="4000" dirty="0">
-              <a:solidFill>
-                <a:srgbClr val="6600FF"/>
-              </a:solidFill>
-              <a:latin typeface="Tahoma" pitchFamily="34" charset="0"/>
-            </a:endParaRPr>
+              <a:t>Explorando Padrões de Mortalidade no Brasil, com Aprendizado de Máquina</a:t>
+            </a:r>
           </a:p>
         </p:txBody>
       </p:sp>
@@ -2317,6 +1985,166 @@
           <a:p>
             <a:pPr algn="ctr"/>
             <a:r>
+              <a:rPr lang="en-US" sz="4400" b="1" dirty="0" err="1">
+                <a:solidFill>
+                  <a:schemeClr val="bg1"/>
+                </a:solidFill>
+                <a:latin typeface="Arial" panose="020B0604020202020204" pitchFamily="34" charset="0"/>
+                <a:cs typeface="Arial" panose="020B0604020202020204" pitchFamily="34" charset="0"/>
+              </a:rPr>
+              <a:t>Introdução</a:t>
+            </a:r>
+            <a:endParaRPr lang="en-US" sz="4400" b="1" dirty="0">
+              <a:solidFill>
+                <a:schemeClr val="bg1"/>
+              </a:solidFill>
+              <a:latin typeface="Arial" panose="020B0604020202020204" pitchFamily="34" charset="0"/>
+              <a:cs typeface="Arial" panose="020B0604020202020204" pitchFamily="34" charset="0"/>
+            </a:endParaRPr>
+          </a:p>
+        </p:txBody>
+      </p:sp>
+      <p:sp>
+        <p:nvSpPr>
+          <p:cNvPr id="2" name="TextBox 13">
+            <a:extLst>
+              <a:ext uri="{FF2B5EF4-FFF2-40B4-BE49-F238E27FC236}">
+                <a16:creationId xmlns:a16="http://schemas.microsoft.com/office/drawing/2014/main" id="{25F21E3A-AF4C-AFD9-1219-BCA1539BB4F0}"/>
+              </a:ext>
+            </a:extLst>
+          </p:cNvPr>
+          <p:cNvSpPr txBox="1"/>
+          <p:nvPr/>
+        </p:nvSpPr>
+        <p:spPr>
+          <a:xfrm>
+            <a:off x="13520829" y="7600728"/>
+            <a:ext cx="12025336" cy="769441"/>
+          </a:xfrm>
+          <a:prstGeom prst="rect">
+            <a:avLst/>
+          </a:prstGeom>
+          <a:solidFill>
+            <a:schemeClr val="tx1"/>
+          </a:solidFill>
+          <a:ln w="3175">
+            <a:solidFill>
+              <a:schemeClr val="tx1"/>
+            </a:solidFill>
+          </a:ln>
+        </p:spPr>
+        <p:txBody>
+          <a:bodyPr wrap="square" rtlCol="0">
+            <a:spAutoFit/>
+          </a:bodyPr>
+          <a:lstStyle>
+            <a:defPPr>
+              <a:defRPr lang="en-US"/>
+            </a:defPPr>
+            <a:lvl1pPr marL="0" algn="l" defTabSz="3907381" rtl="0" eaLnBrk="1" latinLnBrk="0" hangingPunct="1">
+              <a:defRPr sz="7693" kern="1200">
+                <a:solidFill>
+                  <a:schemeClr val="tx1"/>
+                </a:solidFill>
+                <a:latin typeface="+mn-lt"/>
+                <a:ea typeface="+mn-ea"/>
+                <a:cs typeface="+mn-cs"/>
+              </a:defRPr>
+            </a:lvl1pPr>
+            <a:lvl2pPr marL="1953690" algn="l" defTabSz="3907381" rtl="0" eaLnBrk="1" latinLnBrk="0" hangingPunct="1">
+              <a:defRPr sz="7693" kern="1200">
+                <a:solidFill>
+                  <a:schemeClr val="tx1"/>
+                </a:solidFill>
+                <a:latin typeface="+mn-lt"/>
+                <a:ea typeface="+mn-ea"/>
+                <a:cs typeface="+mn-cs"/>
+              </a:defRPr>
+            </a:lvl2pPr>
+            <a:lvl3pPr marL="3907381" algn="l" defTabSz="3907381" rtl="0" eaLnBrk="1" latinLnBrk="0" hangingPunct="1">
+              <a:defRPr sz="7693" kern="1200">
+                <a:solidFill>
+                  <a:schemeClr val="tx1"/>
+                </a:solidFill>
+                <a:latin typeface="+mn-lt"/>
+                <a:ea typeface="+mn-ea"/>
+                <a:cs typeface="+mn-cs"/>
+              </a:defRPr>
+            </a:lvl3pPr>
+            <a:lvl4pPr marL="5861070" algn="l" defTabSz="3907381" rtl="0" eaLnBrk="1" latinLnBrk="0" hangingPunct="1">
+              <a:defRPr sz="7693" kern="1200">
+                <a:solidFill>
+                  <a:schemeClr val="tx1"/>
+                </a:solidFill>
+                <a:latin typeface="+mn-lt"/>
+                <a:ea typeface="+mn-ea"/>
+                <a:cs typeface="+mn-cs"/>
+              </a:defRPr>
+            </a:lvl4pPr>
+            <a:lvl5pPr marL="7814760" algn="l" defTabSz="3907381" rtl="0" eaLnBrk="1" latinLnBrk="0" hangingPunct="1">
+              <a:defRPr sz="7693" kern="1200">
+                <a:solidFill>
+                  <a:schemeClr val="tx1"/>
+                </a:solidFill>
+                <a:latin typeface="+mn-lt"/>
+                <a:ea typeface="+mn-ea"/>
+                <a:cs typeface="+mn-cs"/>
+              </a:defRPr>
+            </a:lvl5pPr>
+            <a:lvl6pPr marL="9768454" algn="l" defTabSz="3907381" rtl="0" eaLnBrk="1" latinLnBrk="0" hangingPunct="1">
+              <a:defRPr sz="7693" kern="1200">
+                <a:solidFill>
+                  <a:schemeClr val="tx1"/>
+                </a:solidFill>
+                <a:latin typeface="+mn-lt"/>
+                <a:ea typeface="+mn-ea"/>
+                <a:cs typeface="+mn-cs"/>
+              </a:defRPr>
+            </a:lvl6pPr>
+            <a:lvl7pPr marL="11722143" algn="l" defTabSz="3907381" rtl="0" eaLnBrk="1" latinLnBrk="0" hangingPunct="1">
+              <a:defRPr sz="7693" kern="1200">
+                <a:solidFill>
+                  <a:schemeClr val="tx1"/>
+                </a:solidFill>
+                <a:latin typeface="+mn-lt"/>
+                <a:ea typeface="+mn-ea"/>
+                <a:cs typeface="+mn-cs"/>
+              </a:defRPr>
+            </a:lvl7pPr>
+            <a:lvl8pPr marL="13675833" algn="l" defTabSz="3907381" rtl="0" eaLnBrk="1" latinLnBrk="0" hangingPunct="1">
+              <a:defRPr sz="7693" kern="1200">
+                <a:solidFill>
+                  <a:schemeClr val="tx1"/>
+                </a:solidFill>
+                <a:latin typeface="+mn-lt"/>
+                <a:ea typeface="+mn-ea"/>
+                <a:cs typeface="+mn-cs"/>
+              </a:defRPr>
+            </a:lvl8pPr>
+            <a:lvl9pPr marL="15629523" algn="l" defTabSz="3907381" rtl="0" eaLnBrk="1" latinLnBrk="0" hangingPunct="1">
+              <a:defRPr sz="7693" kern="1200">
+                <a:solidFill>
+                  <a:schemeClr val="tx1"/>
+                </a:solidFill>
+                <a:latin typeface="+mn-lt"/>
+                <a:ea typeface="+mn-ea"/>
+                <a:cs typeface="+mn-cs"/>
+              </a:defRPr>
+            </a:lvl9pPr>
+          </a:lstStyle>
+          <a:p>
+            <a:pPr algn="ctr"/>
+            <a:r>
+              <a:rPr lang="en-US" sz="4400" b="1" dirty="0" err="1">
+                <a:solidFill>
+                  <a:schemeClr val="bg1"/>
+                </a:solidFill>
+                <a:latin typeface="Arial" panose="020B0604020202020204" pitchFamily="34" charset="0"/>
+                <a:cs typeface="Arial" panose="020B0604020202020204" pitchFamily="34" charset="0"/>
+              </a:rPr>
+              <a:t>Experimentos</a:t>
+            </a:r>
+            <a:r>
               <a:rPr lang="en-US" sz="4400" b="1" dirty="0">
                 <a:solidFill>
                   <a:schemeClr val="bg1"/>
@@ -2324,17 +2152,150 @@
                 <a:latin typeface="Arial" panose="020B0604020202020204" pitchFamily="34" charset="0"/>
                 <a:cs typeface="Arial" panose="020B0604020202020204" pitchFamily="34" charset="0"/>
               </a:rPr>
-              <a:t>Preliminaries and </a:t>
-            </a:r>
-            <a:r>
-              <a:rPr lang="en-US" sz="4400" b="1" dirty="0" smtClean="0">
+              <a:t> (2/2)</a:t>
+            </a:r>
+          </a:p>
+        </p:txBody>
+      </p:sp>
+      <p:sp>
+        <p:nvSpPr>
+          <p:cNvPr id="6" name="TextBox 13">
+            <a:extLst>
+              <a:ext uri="{FF2B5EF4-FFF2-40B4-BE49-F238E27FC236}">
+                <a16:creationId xmlns:a16="http://schemas.microsoft.com/office/drawing/2014/main" id="{6C4B33FE-ABA4-CB0C-EB27-D69667741420}"/>
+              </a:ext>
+            </a:extLst>
+          </p:cNvPr>
+          <p:cNvSpPr txBox="1"/>
+          <p:nvPr/>
+        </p:nvSpPr>
+        <p:spPr>
+          <a:xfrm>
+            <a:off x="1309664" y="16348870"/>
+            <a:ext cx="12025336" cy="769441"/>
+          </a:xfrm>
+          <a:prstGeom prst="rect">
+            <a:avLst/>
+          </a:prstGeom>
+          <a:solidFill>
+            <a:schemeClr val="tx1"/>
+          </a:solidFill>
+          <a:ln w="3175">
+            <a:solidFill>
+              <a:schemeClr val="tx1"/>
+            </a:solidFill>
+          </a:ln>
+        </p:spPr>
+        <p:txBody>
+          <a:bodyPr wrap="square" rtlCol="0">
+            <a:spAutoFit/>
+          </a:bodyPr>
+          <a:lstStyle>
+            <a:defPPr>
+              <a:defRPr lang="en-US"/>
+            </a:defPPr>
+            <a:lvl1pPr marL="0" algn="l" defTabSz="3907381" rtl="0" eaLnBrk="1" latinLnBrk="0" hangingPunct="1">
+              <a:defRPr sz="7693" kern="1200">
+                <a:solidFill>
+                  <a:schemeClr val="tx1"/>
+                </a:solidFill>
+                <a:latin typeface="+mn-lt"/>
+                <a:ea typeface="+mn-ea"/>
+                <a:cs typeface="+mn-cs"/>
+              </a:defRPr>
+            </a:lvl1pPr>
+            <a:lvl2pPr marL="1953690" algn="l" defTabSz="3907381" rtl="0" eaLnBrk="1" latinLnBrk="0" hangingPunct="1">
+              <a:defRPr sz="7693" kern="1200">
+                <a:solidFill>
+                  <a:schemeClr val="tx1"/>
+                </a:solidFill>
+                <a:latin typeface="+mn-lt"/>
+                <a:ea typeface="+mn-ea"/>
+                <a:cs typeface="+mn-cs"/>
+              </a:defRPr>
+            </a:lvl2pPr>
+            <a:lvl3pPr marL="3907381" algn="l" defTabSz="3907381" rtl="0" eaLnBrk="1" latinLnBrk="0" hangingPunct="1">
+              <a:defRPr sz="7693" kern="1200">
+                <a:solidFill>
+                  <a:schemeClr val="tx1"/>
+                </a:solidFill>
+                <a:latin typeface="+mn-lt"/>
+                <a:ea typeface="+mn-ea"/>
+                <a:cs typeface="+mn-cs"/>
+              </a:defRPr>
+            </a:lvl3pPr>
+            <a:lvl4pPr marL="5861070" algn="l" defTabSz="3907381" rtl="0" eaLnBrk="1" latinLnBrk="0" hangingPunct="1">
+              <a:defRPr sz="7693" kern="1200">
+                <a:solidFill>
+                  <a:schemeClr val="tx1"/>
+                </a:solidFill>
+                <a:latin typeface="+mn-lt"/>
+                <a:ea typeface="+mn-ea"/>
+                <a:cs typeface="+mn-cs"/>
+              </a:defRPr>
+            </a:lvl4pPr>
+            <a:lvl5pPr marL="7814760" algn="l" defTabSz="3907381" rtl="0" eaLnBrk="1" latinLnBrk="0" hangingPunct="1">
+              <a:defRPr sz="7693" kern="1200">
+                <a:solidFill>
+                  <a:schemeClr val="tx1"/>
+                </a:solidFill>
+                <a:latin typeface="+mn-lt"/>
+                <a:ea typeface="+mn-ea"/>
+                <a:cs typeface="+mn-cs"/>
+              </a:defRPr>
+            </a:lvl5pPr>
+            <a:lvl6pPr marL="9768454" algn="l" defTabSz="3907381" rtl="0" eaLnBrk="1" latinLnBrk="0" hangingPunct="1">
+              <a:defRPr sz="7693" kern="1200">
+                <a:solidFill>
+                  <a:schemeClr val="tx1"/>
+                </a:solidFill>
+                <a:latin typeface="+mn-lt"/>
+                <a:ea typeface="+mn-ea"/>
+                <a:cs typeface="+mn-cs"/>
+              </a:defRPr>
+            </a:lvl6pPr>
+            <a:lvl7pPr marL="11722143" algn="l" defTabSz="3907381" rtl="0" eaLnBrk="1" latinLnBrk="0" hangingPunct="1">
+              <a:defRPr sz="7693" kern="1200">
+                <a:solidFill>
+                  <a:schemeClr val="tx1"/>
+                </a:solidFill>
+                <a:latin typeface="+mn-lt"/>
+                <a:ea typeface="+mn-ea"/>
+                <a:cs typeface="+mn-cs"/>
+              </a:defRPr>
+            </a:lvl7pPr>
+            <a:lvl8pPr marL="13675833" algn="l" defTabSz="3907381" rtl="0" eaLnBrk="1" latinLnBrk="0" hangingPunct="1">
+              <a:defRPr sz="7693" kern="1200">
+                <a:solidFill>
+                  <a:schemeClr val="tx1"/>
+                </a:solidFill>
+                <a:latin typeface="+mn-lt"/>
+                <a:ea typeface="+mn-ea"/>
+                <a:cs typeface="+mn-cs"/>
+              </a:defRPr>
+            </a:lvl8pPr>
+            <a:lvl9pPr marL="15629523" algn="l" defTabSz="3907381" rtl="0" eaLnBrk="1" latinLnBrk="0" hangingPunct="1">
+              <a:defRPr sz="7693" kern="1200">
+                <a:solidFill>
+                  <a:schemeClr val="tx1"/>
+                </a:solidFill>
+                <a:latin typeface="+mn-lt"/>
+                <a:ea typeface="+mn-ea"/>
+                <a:cs typeface="+mn-cs"/>
+              </a:defRPr>
+            </a:lvl9pPr>
+          </a:lstStyle>
+          <a:p>
+            <a:pPr algn="ctr"/>
+            <a:r>
+              <a:rPr lang="en-US" sz="4400" b="1" dirty="0" err="1">
                 <a:solidFill>
                   <a:schemeClr val="bg1"/>
                 </a:solidFill>
                 <a:latin typeface="Arial" panose="020B0604020202020204" pitchFamily="34" charset="0"/>
                 <a:cs typeface="Arial" panose="020B0604020202020204" pitchFamily="34" charset="0"/>
               </a:rPr>
-              <a:t> Problem </a:t>
+              <a:t>Preliminares</a:t>
             </a:r>
             <a:r>
               <a:rPr lang="en-US" sz="4400" b="1" dirty="0">
@@ -2344,8 +2305,1748 @@
                 <a:latin typeface="Arial" panose="020B0604020202020204" pitchFamily="34" charset="0"/>
                 <a:cs typeface="Arial" panose="020B0604020202020204" pitchFamily="34" charset="0"/>
               </a:rPr>
-              <a:t>Statement</a:t>
-            </a:r>
+              <a:t> e </a:t>
+            </a:r>
+            <a:r>
+              <a:rPr lang="en-US" sz="4400" b="1" dirty="0" err="1">
+                <a:solidFill>
+                  <a:schemeClr val="bg1"/>
+                </a:solidFill>
+                <a:latin typeface="Arial" panose="020B0604020202020204" pitchFamily="34" charset="0"/>
+                <a:cs typeface="Arial" panose="020B0604020202020204" pitchFamily="34" charset="0"/>
+              </a:rPr>
+              <a:t>Definição</a:t>
+            </a:r>
+            <a:r>
+              <a:rPr lang="en-US" sz="4400" b="1" dirty="0">
+                <a:solidFill>
+                  <a:schemeClr val="bg1"/>
+                </a:solidFill>
+                <a:latin typeface="Arial" panose="020B0604020202020204" pitchFamily="34" charset="0"/>
+                <a:cs typeface="Arial" panose="020B0604020202020204" pitchFamily="34" charset="0"/>
+              </a:rPr>
+              <a:t> do </a:t>
+            </a:r>
+            <a:r>
+              <a:rPr lang="en-US" sz="4400" b="1" dirty="0" err="1">
+                <a:solidFill>
+                  <a:schemeClr val="bg1"/>
+                </a:solidFill>
+                <a:latin typeface="Arial" panose="020B0604020202020204" pitchFamily="34" charset="0"/>
+                <a:cs typeface="Arial" panose="020B0604020202020204" pitchFamily="34" charset="0"/>
+              </a:rPr>
+              <a:t>Problema</a:t>
+            </a:r>
+            <a:endParaRPr lang="en-US" sz="4400" b="1" dirty="0">
+              <a:solidFill>
+                <a:schemeClr val="bg1"/>
+              </a:solidFill>
+              <a:latin typeface="Arial" panose="020B0604020202020204" pitchFamily="34" charset="0"/>
+              <a:cs typeface="Arial" panose="020B0604020202020204" pitchFamily="34" charset="0"/>
+            </a:endParaRPr>
+          </a:p>
+        </p:txBody>
+      </p:sp>
+      <p:sp>
+        <p:nvSpPr>
+          <p:cNvPr id="10" name="TextBox 13">
+            <a:extLst>
+              <a:ext uri="{FF2B5EF4-FFF2-40B4-BE49-F238E27FC236}">
+                <a16:creationId xmlns:a16="http://schemas.microsoft.com/office/drawing/2014/main" id="{EF097D8B-D9CD-4C4A-D7DD-162DA3DCA3CA}"/>
+              </a:ext>
+            </a:extLst>
+          </p:cNvPr>
+          <p:cNvSpPr txBox="1"/>
+          <p:nvPr/>
+        </p:nvSpPr>
+        <p:spPr>
+          <a:xfrm>
+            <a:off x="13520829" y="30859312"/>
+            <a:ext cx="12025336" cy="769441"/>
+          </a:xfrm>
+          <a:prstGeom prst="rect">
+            <a:avLst/>
+          </a:prstGeom>
+          <a:solidFill>
+            <a:schemeClr val="tx1"/>
+          </a:solidFill>
+          <a:ln w="3175">
+            <a:solidFill>
+              <a:schemeClr val="tx1"/>
+            </a:solidFill>
+          </a:ln>
+        </p:spPr>
+        <p:txBody>
+          <a:bodyPr wrap="square" rtlCol="0">
+            <a:spAutoFit/>
+          </a:bodyPr>
+          <a:lstStyle>
+            <a:defPPr>
+              <a:defRPr lang="en-US"/>
+            </a:defPPr>
+            <a:lvl1pPr marL="0" algn="l" defTabSz="3907381" rtl="0" eaLnBrk="1" latinLnBrk="0" hangingPunct="1">
+              <a:defRPr sz="7693" kern="1200">
+                <a:solidFill>
+                  <a:schemeClr val="tx1"/>
+                </a:solidFill>
+                <a:latin typeface="+mn-lt"/>
+                <a:ea typeface="+mn-ea"/>
+                <a:cs typeface="+mn-cs"/>
+              </a:defRPr>
+            </a:lvl1pPr>
+            <a:lvl2pPr marL="1953690" algn="l" defTabSz="3907381" rtl="0" eaLnBrk="1" latinLnBrk="0" hangingPunct="1">
+              <a:defRPr sz="7693" kern="1200">
+                <a:solidFill>
+                  <a:schemeClr val="tx1"/>
+                </a:solidFill>
+                <a:latin typeface="+mn-lt"/>
+                <a:ea typeface="+mn-ea"/>
+                <a:cs typeface="+mn-cs"/>
+              </a:defRPr>
+            </a:lvl2pPr>
+            <a:lvl3pPr marL="3907381" algn="l" defTabSz="3907381" rtl="0" eaLnBrk="1" latinLnBrk="0" hangingPunct="1">
+              <a:defRPr sz="7693" kern="1200">
+                <a:solidFill>
+                  <a:schemeClr val="tx1"/>
+                </a:solidFill>
+                <a:latin typeface="+mn-lt"/>
+                <a:ea typeface="+mn-ea"/>
+                <a:cs typeface="+mn-cs"/>
+              </a:defRPr>
+            </a:lvl3pPr>
+            <a:lvl4pPr marL="5861070" algn="l" defTabSz="3907381" rtl="0" eaLnBrk="1" latinLnBrk="0" hangingPunct="1">
+              <a:defRPr sz="7693" kern="1200">
+                <a:solidFill>
+                  <a:schemeClr val="tx1"/>
+                </a:solidFill>
+                <a:latin typeface="+mn-lt"/>
+                <a:ea typeface="+mn-ea"/>
+                <a:cs typeface="+mn-cs"/>
+              </a:defRPr>
+            </a:lvl4pPr>
+            <a:lvl5pPr marL="7814760" algn="l" defTabSz="3907381" rtl="0" eaLnBrk="1" latinLnBrk="0" hangingPunct="1">
+              <a:defRPr sz="7693" kern="1200">
+                <a:solidFill>
+                  <a:schemeClr val="tx1"/>
+                </a:solidFill>
+                <a:latin typeface="+mn-lt"/>
+                <a:ea typeface="+mn-ea"/>
+                <a:cs typeface="+mn-cs"/>
+              </a:defRPr>
+            </a:lvl5pPr>
+            <a:lvl6pPr marL="9768454" algn="l" defTabSz="3907381" rtl="0" eaLnBrk="1" latinLnBrk="0" hangingPunct="1">
+              <a:defRPr sz="7693" kern="1200">
+                <a:solidFill>
+                  <a:schemeClr val="tx1"/>
+                </a:solidFill>
+                <a:latin typeface="+mn-lt"/>
+                <a:ea typeface="+mn-ea"/>
+                <a:cs typeface="+mn-cs"/>
+              </a:defRPr>
+            </a:lvl6pPr>
+            <a:lvl7pPr marL="11722143" algn="l" defTabSz="3907381" rtl="0" eaLnBrk="1" latinLnBrk="0" hangingPunct="1">
+              <a:defRPr sz="7693" kern="1200">
+                <a:solidFill>
+                  <a:schemeClr val="tx1"/>
+                </a:solidFill>
+                <a:latin typeface="+mn-lt"/>
+                <a:ea typeface="+mn-ea"/>
+                <a:cs typeface="+mn-cs"/>
+              </a:defRPr>
+            </a:lvl7pPr>
+            <a:lvl8pPr marL="13675833" algn="l" defTabSz="3907381" rtl="0" eaLnBrk="1" latinLnBrk="0" hangingPunct="1">
+              <a:defRPr sz="7693" kern="1200">
+                <a:solidFill>
+                  <a:schemeClr val="tx1"/>
+                </a:solidFill>
+                <a:latin typeface="+mn-lt"/>
+                <a:ea typeface="+mn-ea"/>
+                <a:cs typeface="+mn-cs"/>
+              </a:defRPr>
+            </a:lvl8pPr>
+            <a:lvl9pPr marL="15629523" algn="l" defTabSz="3907381" rtl="0" eaLnBrk="1" latinLnBrk="0" hangingPunct="1">
+              <a:defRPr sz="7693" kern="1200">
+                <a:solidFill>
+                  <a:schemeClr val="tx1"/>
+                </a:solidFill>
+                <a:latin typeface="+mn-lt"/>
+                <a:ea typeface="+mn-ea"/>
+                <a:cs typeface="+mn-cs"/>
+              </a:defRPr>
+            </a:lvl9pPr>
+          </a:lstStyle>
+          <a:p>
+            <a:pPr algn="ctr"/>
+            <a:r>
+              <a:rPr lang="en-US" sz="4400" b="1" dirty="0" err="1">
+                <a:solidFill>
+                  <a:schemeClr val="bg1"/>
+                </a:solidFill>
+                <a:latin typeface="Arial" panose="020B0604020202020204" pitchFamily="34" charset="0"/>
+                <a:cs typeface="Arial" panose="020B0604020202020204" pitchFamily="34" charset="0"/>
+              </a:rPr>
+              <a:t>Conclusões</a:t>
+            </a:r>
+            <a:endParaRPr lang="en-US" sz="4400" b="1" dirty="0">
+              <a:solidFill>
+                <a:schemeClr val="bg1"/>
+              </a:solidFill>
+              <a:latin typeface="Arial" panose="020B0604020202020204" pitchFamily="34" charset="0"/>
+              <a:cs typeface="Arial" panose="020B0604020202020204" pitchFamily="34" charset="0"/>
+            </a:endParaRPr>
+          </a:p>
+        </p:txBody>
+      </p:sp>
+      <p:sp>
+        <p:nvSpPr>
+          <p:cNvPr id="11" name="CaixaDeTexto 10">
+            <a:extLst>
+              <a:ext uri="{FF2B5EF4-FFF2-40B4-BE49-F238E27FC236}">
+                <a16:creationId xmlns:a16="http://schemas.microsoft.com/office/drawing/2014/main" id="{4FF31683-3869-1A56-38BD-3A473824A6D7}"/>
+              </a:ext>
+            </a:extLst>
+          </p:cNvPr>
+          <p:cNvSpPr txBox="1"/>
+          <p:nvPr/>
+        </p:nvSpPr>
+        <p:spPr>
+          <a:xfrm>
+            <a:off x="1279001" y="8612565"/>
+            <a:ext cx="12025312" cy="6001643"/>
+          </a:xfrm>
+          <a:prstGeom prst="rect">
+            <a:avLst/>
+          </a:prstGeom>
+          <a:noFill/>
+        </p:spPr>
+        <p:txBody>
+          <a:bodyPr wrap="square" rtlCol="0">
+            <a:spAutoFit/>
+          </a:bodyPr>
+          <a:lstStyle/>
+          <a:p>
+            <a:pPr marL="342900" indent="-342900">
+              <a:buFont typeface="Arial" panose="020B0604020202020204" pitchFamily="34" charset="0"/>
+              <a:buChar char="•"/>
+            </a:pPr>
+            <a:r>
+              <a:rPr lang="pt-BR" dirty="0">
+                <a:latin typeface="Arial" panose="020B0604020202020204" pitchFamily="34" charset="0"/>
+                <a:ea typeface="Calibri" panose="020F0502020204030204" pitchFamily="34" charset="0"/>
+                <a:cs typeface="Arial" panose="020B0604020202020204" pitchFamily="34" charset="0"/>
+              </a:rPr>
+              <a:t>As causas de morte refletem uma complexa interação sociais, biológicos e comportamentais</a:t>
+            </a:r>
+          </a:p>
+          <a:p>
+            <a:pPr marL="342900" indent="-342900">
+              <a:buFont typeface="Arial" panose="020B0604020202020204" pitchFamily="34" charset="0"/>
+              <a:buChar char="•"/>
+            </a:pPr>
+            <a:endParaRPr lang="pt-BR" dirty="0">
+              <a:latin typeface="Arial" panose="020B0604020202020204" pitchFamily="34" charset="0"/>
+              <a:ea typeface="Calibri" panose="020F0502020204030204" pitchFamily="34" charset="0"/>
+              <a:cs typeface="Arial" panose="020B0604020202020204" pitchFamily="34" charset="0"/>
+            </a:endParaRPr>
+          </a:p>
+          <a:p>
+            <a:pPr marL="342900" indent="-342900">
+              <a:buFont typeface="Arial" panose="020B0604020202020204" pitchFamily="34" charset="0"/>
+              <a:buChar char="•"/>
+            </a:pPr>
+            <a:r>
+              <a:rPr lang="pt-BR" dirty="0">
+                <a:latin typeface="Arial" panose="020B0604020202020204" pitchFamily="34" charset="0"/>
+                <a:ea typeface="Calibri" panose="020F0502020204030204" pitchFamily="34" charset="0"/>
+                <a:cs typeface="Arial" panose="020B0604020202020204" pitchFamily="34" charset="0"/>
+              </a:rPr>
+              <a:t>A compreensão da relação entre esses fatores é fundamental para a construção de políticas de saúde pública e melhorar a qualidade e expectativa de vida da população</a:t>
+            </a:r>
+          </a:p>
+          <a:p>
+            <a:pPr marL="342900" indent="-342900">
+              <a:buFont typeface="Arial" panose="020B0604020202020204" pitchFamily="34" charset="0"/>
+              <a:buChar char="•"/>
+            </a:pPr>
+            <a:endParaRPr lang="pt-BR" dirty="0">
+              <a:latin typeface="Arial" panose="020B0604020202020204" pitchFamily="34" charset="0"/>
+              <a:ea typeface="Calibri" panose="020F0502020204030204" pitchFamily="34" charset="0"/>
+              <a:cs typeface="Arial" panose="020B0604020202020204" pitchFamily="34" charset="0"/>
+            </a:endParaRPr>
+          </a:p>
+          <a:p>
+            <a:pPr marL="342900" indent="-342900">
+              <a:buFont typeface="Arial" panose="020B0604020202020204" pitchFamily="34" charset="0"/>
+              <a:buChar char="•"/>
+            </a:pPr>
+            <a:r>
+              <a:rPr lang="pt-BR" dirty="0">
+                <a:latin typeface="Arial" panose="020B0604020202020204" pitchFamily="34" charset="0"/>
+                <a:ea typeface="Calibri" panose="020F0502020204030204" pitchFamily="34" charset="0"/>
+                <a:cs typeface="Arial" panose="020B0604020202020204" pitchFamily="34" charset="0"/>
+              </a:rPr>
+              <a:t>Por meio dos dados públicos de saúde pesquisadores no Brasil e EUA já demonstraram a relação de fatores, como a cor da pele, nas causas de morte</a:t>
+            </a:r>
+          </a:p>
+          <a:p>
+            <a:pPr marL="342900" indent="-342900">
+              <a:buFont typeface="Arial" panose="020B0604020202020204" pitchFamily="34" charset="0"/>
+              <a:buChar char="•"/>
+            </a:pPr>
+            <a:endParaRPr lang="pt-BR" dirty="0">
+              <a:latin typeface="Arial" panose="020B0604020202020204" pitchFamily="34" charset="0"/>
+              <a:ea typeface="Calibri" panose="020F0502020204030204" pitchFamily="34" charset="0"/>
+              <a:cs typeface="Arial" panose="020B0604020202020204" pitchFamily="34" charset="0"/>
+            </a:endParaRPr>
+          </a:p>
+          <a:p>
+            <a:pPr marL="342900" indent="-342900">
+              <a:buFont typeface="Arial" panose="020B0604020202020204" pitchFamily="34" charset="0"/>
+              <a:buChar char="•"/>
+            </a:pPr>
+            <a:r>
+              <a:rPr lang="pt-BR" dirty="0">
+                <a:latin typeface="Arial" panose="020B0604020202020204" pitchFamily="34" charset="0"/>
+                <a:ea typeface="Calibri" panose="020F0502020204030204" pitchFamily="34" charset="0"/>
+                <a:cs typeface="Arial" panose="020B0604020202020204" pitchFamily="34" charset="0"/>
+              </a:rPr>
+              <a:t>O aprendizado supervisionado é uma técnica que permite a partir de amostras categorizadas, descritas por diferentes atributos, prever, em um novo conjunto de dados com os mesmos atributos, qual a categoria das novas amostras</a:t>
+            </a:r>
+          </a:p>
+          <a:p>
+            <a:pPr marL="342900" indent="-342900">
+              <a:buFont typeface="Arial" panose="020B0604020202020204" pitchFamily="34" charset="0"/>
+              <a:buChar char="•"/>
+            </a:pPr>
+            <a:endParaRPr lang="pt-BR" dirty="0">
+              <a:latin typeface="Arial" panose="020B0604020202020204" pitchFamily="34" charset="0"/>
+              <a:ea typeface="Calibri" panose="020F0502020204030204" pitchFamily="34" charset="0"/>
+              <a:cs typeface="Arial" panose="020B0604020202020204" pitchFamily="34" charset="0"/>
+            </a:endParaRPr>
+          </a:p>
+          <a:p>
+            <a:pPr marL="342900" indent="-342900">
+              <a:buFont typeface="Arial" panose="020B0604020202020204" pitchFamily="34" charset="0"/>
+              <a:buChar char="•"/>
+            </a:pPr>
+            <a:r>
+              <a:rPr lang="pt-BR" dirty="0">
+                <a:latin typeface="Arial" panose="020B0604020202020204" pitchFamily="34" charset="0"/>
+                <a:ea typeface="Calibri" panose="020F0502020204030204" pitchFamily="34" charset="0"/>
+                <a:cs typeface="Arial" panose="020B0604020202020204" pitchFamily="34" charset="0"/>
+              </a:rPr>
+              <a:t>Nesse trabalho, diferentes técnicas de aprendizado supervisionado foram aplicadas a amostras de falecimentos</a:t>
+            </a:r>
+          </a:p>
+        </p:txBody>
+      </p:sp>
+      <p:sp>
+        <p:nvSpPr>
+          <p:cNvPr id="12" name="CaixaDeTexto 11">
+            <a:extLst>
+              <a:ext uri="{FF2B5EF4-FFF2-40B4-BE49-F238E27FC236}">
+                <a16:creationId xmlns:a16="http://schemas.microsoft.com/office/drawing/2014/main" id="{F5EFA2DB-79E7-7128-F584-0DAB3430093A}"/>
+              </a:ext>
+            </a:extLst>
+          </p:cNvPr>
+          <p:cNvSpPr txBox="1"/>
+          <p:nvPr/>
+        </p:nvSpPr>
+        <p:spPr>
+          <a:xfrm>
+            <a:off x="1309689" y="17515826"/>
+            <a:ext cx="12025312" cy="11541621"/>
+          </a:xfrm>
+          <a:prstGeom prst="rect">
+            <a:avLst/>
+          </a:prstGeom>
+          <a:noFill/>
+        </p:spPr>
+        <p:txBody>
+          <a:bodyPr wrap="square" rtlCol="0">
+            <a:spAutoFit/>
+          </a:bodyPr>
+          <a:lstStyle/>
+          <a:p>
+            <a:pPr marL="342900" indent="-342900">
+              <a:buFont typeface="Arial" panose="020B0604020202020204" pitchFamily="34" charset="0"/>
+              <a:buChar char="•"/>
+            </a:pPr>
+            <a:r>
+              <a:rPr lang="pt-BR" dirty="0">
+                <a:latin typeface="Arial" panose="020B0604020202020204" pitchFamily="34" charset="0"/>
+                <a:ea typeface="Calibri" panose="020F0502020204030204" pitchFamily="34" charset="0"/>
+                <a:cs typeface="Arial" panose="020B0604020202020204" pitchFamily="34" charset="0"/>
+              </a:rPr>
+              <a:t>No Brasil, os óbitos com diversos atributos são registrados nos Sistemas de Informação de Mortalidade (SIM), na plataforma </a:t>
+            </a:r>
+            <a:r>
+              <a:rPr lang="pt-BR" dirty="0" err="1">
+                <a:latin typeface="Arial" panose="020B0604020202020204" pitchFamily="34" charset="0"/>
+                <a:ea typeface="Calibri" panose="020F0502020204030204" pitchFamily="34" charset="0"/>
+                <a:cs typeface="Arial" panose="020B0604020202020204" pitchFamily="34" charset="0"/>
+              </a:rPr>
+              <a:t>DataSUS</a:t>
+            </a:r>
+            <a:endParaRPr lang="pt-BR" dirty="0">
+              <a:latin typeface="Arial" panose="020B0604020202020204" pitchFamily="34" charset="0"/>
+              <a:ea typeface="Calibri" panose="020F0502020204030204" pitchFamily="34" charset="0"/>
+              <a:cs typeface="Arial" panose="020B0604020202020204" pitchFamily="34" charset="0"/>
+            </a:endParaRPr>
+          </a:p>
+          <a:p>
+            <a:pPr marL="342900" indent="-342900">
+              <a:buFont typeface="Arial" panose="020B0604020202020204" pitchFamily="34" charset="0"/>
+              <a:buChar char="•"/>
+            </a:pPr>
+            <a:endParaRPr lang="pt-BR" dirty="0">
+              <a:latin typeface="Arial" panose="020B0604020202020204" pitchFamily="34" charset="0"/>
+              <a:ea typeface="Calibri" panose="020F0502020204030204" pitchFamily="34" charset="0"/>
+              <a:cs typeface="Arial" panose="020B0604020202020204" pitchFamily="34" charset="0"/>
+            </a:endParaRPr>
+          </a:p>
+          <a:p>
+            <a:pPr marL="342900" indent="-342900">
+              <a:buFont typeface="Arial" panose="020B0604020202020204" pitchFamily="34" charset="0"/>
+              <a:buChar char="•"/>
+            </a:pPr>
+            <a:r>
+              <a:rPr lang="pt-BR" dirty="0">
+                <a:latin typeface="Arial" panose="020B0604020202020204" pitchFamily="34" charset="0"/>
+                <a:ea typeface="Calibri" panose="020F0502020204030204" pitchFamily="34" charset="0"/>
+                <a:cs typeface="Arial" panose="020B0604020202020204" pitchFamily="34" charset="0"/>
+              </a:rPr>
+              <a:t>A Fiocruz, por meio da Plataforma de Ciência de Dados aplicada à saúde, extrai e enriquece as bases disponibilizadas pelo governo. A base final contém 159 atributos, dos quais muitos são categóricos, de todos os óbitos de 1996 a 2021</a:t>
+            </a:r>
+          </a:p>
+          <a:p>
+            <a:pPr marL="342900" indent="-342900">
+              <a:buFont typeface="Arial" panose="020B0604020202020204" pitchFamily="34" charset="0"/>
+              <a:buChar char="•"/>
+            </a:pPr>
+            <a:endParaRPr lang="pt-BR" dirty="0">
+              <a:latin typeface="Arial" panose="020B0604020202020204" pitchFamily="34" charset="0"/>
+              <a:ea typeface="Calibri" panose="020F0502020204030204" pitchFamily="34" charset="0"/>
+              <a:cs typeface="Arial" panose="020B0604020202020204" pitchFamily="34" charset="0"/>
+            </a:endParaRPr>
+          </a:p>
+          <a:p>
+            <a:pPr marL="342900" indent="-342900">
+              <a:buFont typeface="Arial" panose="020B0604020202020204" pitchFamily="34" charset="0"/>
+              <a:buChar char="•"/>
+            </a:pPr>
+            <a:r>
+              <a:rPr lang="pt-BR" dirty="0">
+                <a:latin typeface="Arial" panose="020B0604020202020204" pitchFamily="34" charset="0"/>
+                <a:ea typeface="Calibri" panose="020F0502020204030204" pitchFamily="34" charset="0"/>
+                <a:cs typeface="Arial" panose="020B0604020202020204" pitchFamily="34" charset="0"/>
+              </a:rPr>
+              <a:t>Em virtude do número extenso de atributos e amostras, escolheu-se reduzir o espaço amostral para o Estado de SP</a:t>
+            </a:r>
+          </a:p>
+          <a:p>
+            <a:pPr marL="342900" indent="-342900">
+              <a:buFont typeface="Arial" panose="020B0604020202020204" pitchFamily="34" charset="0"/>
+              <a:buChar char="•"/>
+            </a:pPr>
+            <a:endParaRPr lang="pt-BR" dirty="0">
+              <a:latin typeface="Arial" panose="020B0604020202020204" pitchFamily="34" charset="0"/>
+              <a:ea typeface="Calibri" panose="020F0502020204030204" pitchFamily="34" charset="0"/>
+              <a:cs typeface="Arial" panose="020B0604020202020204" pitchFamily="34" charset="0"/>
+            </a:endParaRPr>
+          </a:p>
+          <a:p>
+            <a:pPr marL="342900" indent="-342900">
+              <a:buFont typeface="Arial" panose="020B0604020202020204" pitchFamily="34" charset="0"/>
+              <a:buChar char="•"/>
+            </a:pPr>
+            <a:r>
+              <a:rPr lang="pt-BR" dirty="0">
+                <a:latin typeface="Arial" panose="020B0604020202020204" pitchFamily="34" charset="0"/>
+                <a:ea typeface="Calibri" panose="020F0502020204030204" pitchFamily="34" charset="0"/>
+                <a:cs typeface="Arial" panose="020B0604020202020204" pitchFamily="34" charset="0"/>
+              </a:rPr>
+              <a:t>Pelo número extenso de categorias (19), 9 das quais com menos de 1% de representatividade nas amostras, agrupou-se essas amostras em uma categoria “Outros”</a:t>
+            </a:r>
+          </a:p>
+          <a:p>
+            <a:pPr marL="342900" indent="-342900">
+              <a:buFont typeface="Arial" panose="020B0604020202020204" pitchFamily="34" charset="0"/>
+              <a:buChar char="•"/>
+            </a:pPr>
+            <a:endParaRPr lang="pt-BR" dirty="0">
+              <a:latin typeface="Arial" panose="020B0604020202020204" pitchFamily="34" charset="0"/>
+              <a:ea typeface="Calibri" panose="020F0502020204030204" pitchFamily="34" charset="0"/>
+              <a:cs typeface="Arial" panose="020B0604020202020204" pitchFamily="34" charset="0"/>
+            </a:endParaRPr>
+          </a:p>
+          <a:p>
+            <a:pPr marL="342900" indent="-342900">
+              <a:buFont typeface="Arial" panose="020B0604020202020204" pitchFamily="34" charset="0"/>
+              <a:buChar char="•"/>
+            </a:pPr>
+            <a:r>
+              <a:rPr lang="pt-BR" dirty="0">
+                <a:latin typeface="Arial" panose="020B0604020202020204" pitchFamily="34" charset="0"/>
+                <a:ea typeface="Calibri" panose="020F0502020204030204" pitchFamily="34" charset="0"/>
+                <a:cs typeface="Arial" panose="020B0604020202020204" pitchFamily="34" charset="0"/>
+              </a:rPr>
+              <a:t>Pelo número ainda elevado de amostras, considerou-se a métrica de “top-k” como indicativo da qualidade do modelo</a:t>
+            </a:r>
+          </a:p>
+          <a:p>
+            <a:pPr marL="342900" indent="-342900">
+              <a:buFont typeface="Arial" panose="020B0604020202020204" pitchFamily="34" charset="0"/>
+              <a:buChar char="•"/>
+            </a:pPr>
+            <a:endParaRPr lang="pt-BR" dirty="0">
+              <a:latin typeface="Arial" panose="020B0604020202020204" pitchFamily="34" charset="0"/>
+              <a:ea typeface="Calibri" panose="020F0502020204030204" pitchFamily="34" charset="0"/>
+              <a:cs typeface="Arial" panose="020B0604020202020204" pitchFamily="34" charset="0"/>
+            </a:endParaRPr>
+          </a:p>
+          <a:p>
+            <a:pPr marL="342900" indent="-342900">
+              <a:buFont typeface="Arial" panose="020B0604020202020204" pitchFamily="34" charset="0"/>
+              <a:buChar char="•"/>
+            </a:pPr>
+            <a:r>
+              <a:rPr lang="pt-BR" dirty="0">
+                <a:latin typeface="Arial" panose="020B0604020202020204" pitchFamily="34" charset="0"/>
+                <a:ea typeface="Calibri" panose="020F0502020204030204" pitchFamily="34" charset="0"/>
+                <a:cs typeface="Arial" panose="020B0604020202020204" pitchFamily="34" charset="0"/>
+              </a:rPr>
+              <a:t>A fim de reduzir o </a:t>
+            </a:r>
+            <a:r>
+              <a:rPr lang="pt-BR" i="1" dirty="0">
+                <a:latin typeface="Arial" panose="020B0604020202020204" pitchFamily="34" charset="0"/>
+                <a:ea typeface="Calibri" panose="020F0502020204030204" pitchFamily="34" charset="0"/>
+                <a:cs typeface="Arial" panose="020B0604020202020204" pitchFamily="34" charset="0"/>
+              </a:rPr>
+              <a:t>bias</a:t>
+            </a:r>
+            <a:r>
+              <a:rPr lang="pt-BR" dirty="0">
+                <a:latin typeface="Arial" panose="020B0604020202020204" pitchFamily="34" charset="0"/>
+                <a:ea typeface="Calibri" panose="020F0502020204030204" pitchFamily="34" charset="0"/>
+                <a:cs typeface="Arial" panose="020B0604020202020204" pitchFamily="34" charset="0"/>
+              </a:rPr>
+              <a:t> do modelo e reduzir o custo computacional do projeto,  selecionou-se 1000 amostras de cada categoria para os dados de treinamento e teste </a:t>
+            </a:r>
+          </a:p>
+          <a:p>
+            <a:endParaRPr lang="pt-BR" b="1" dirty="0">
+              <a:latin typeface="Arial" panose="020B0604020202020204" pitchFamily="34" charset="0"/>
+              <a:ea typeface="Calibri" panose="020F0502020204030204" pitchFamily="34" charset="0"/>
+              <a:cs typeface="Arial" panose="020B0604020202020204" pitchFamily="34" charset="0"/>
+            </a:endParaRPr>
+          </a:p>
+          <a:p>
+            <a:r>
+              <a:rPr lang="pt-BR" b="1" dirty="0">
+                <a:latin typeface="Arial" panose="020B0604020202020204" pitchFamily="34" charset="0"/>
+                <a:ea typeface="Calibri" panose="020F0502020204030204" pitchFamily="34" charset="0"/>
+                <a:cs typeface="Arial" panose="020B0604020202020204" pitchFamily="34" charset="0"/>
+              </a:rPr>
+              <a:t>Questões de pesquisa:</a:t>
+            </a:r>
+          </a:p>
+          <a:p>
+            <a:endParaRPr lang="pt-BR" b="1" dirty="0">
+              <a:latin typeface="Arial" panose="020B0604020202020204" pitchFamily="34" charset="0"/>
+              <a:ea typeface="Calibri" panose="020F0502020204030204" pitchFamily="34" charset="0"/>
+              <a:cs typeface="Arial" panose="020B0604020202020204" pitchFamily="34" charset="0"/>
+            </a:endParaRPr>
+          </a:p>
+          <a:p>
+            <a:pPr marL="457200" indent="-457200">
+              <a:buFont typeface="+mj-lt"/>
+              <a:buAutoNum type="arabicPeriod"/>
+            </a:pPr>
+            <a:r>
+              <a:rPr lang="pt-BR" dirty="0">
+                <a:latin typeface="Arial" panose="020B0604020202020204" pitchFamily="34" charset="0"/>
+                <a:ea typeface="Calibri" panose="020F0502020204030204" pitchFamily="34" charset="0"/>
+                <a:cs typeface="Arial" panose="020B0604020202020204" pitchFamily="34" charset="0"/>
+              </a:rPr>
+              <a:t>Seria possível predizer a causa de morte de um falecido, a partir de um conjunto de dados que reflita particularidades do paciente e do óbito registrado?</a:t>
+            </a:r>
+          </a:p>
+          <a:p>
+            <a:pPr marL="457200" indent="-457200">
+              <a:buFont typeface="+mj-lt"/>
+              <a:buAutoNum type="arabicPeriod"/>
+            </a:pPr>
+            <a:endParaRPr lang="pt-BR" dirty="0">
+              <a:latin typeface="Arial" panose="020B0604020202020204" pitchFamily="34" charset="0"/>
+              <a:ea typeface="Calibri" panose="020F0502020204030204" pitchFamily="34" charset="0"/>
+              <a:cs typeface="Arial" panose="020B0604020202020204" pitchFamily="34" charset="0"/>
+            </a:endParaRPr>
+          </a:p>
+          <a:p>
+            <a:pPr marL="457200" indent="-457200">
+              <a:buFont typeface="+mj-lt"/>
+              <a:buAutoNum type="arabicPeriod"/>
+            </a:pPr>
+            <a:r>
+              <a:rPr lang="pt-BR" i="0" dirty="0">
+                <a:effectLst/>
+                <a:latin typeface="Arial" panose="020B0604020202020204" pitchFamily="34" charset="0"/>
+                <a:cs typeface="Arial" panose="020B0604020202020204" pitchFamily="34" charset="0"/>
+              </a:rPr>
+              <a:t>Os modelos desenvolvidos generalizam os resultados obtidos para amostras</a:t>
+            </a:r>
+            <a:br>
+              <a:rPr lang="pt-BR" dirty="0">
+                <a:latin typeface="Arial" panose="020B0604020202020204" pitchFamily="34" charset="0"/>
+                <a:cs typeface="Arial" panose="020B0604020202020204" pitchFamily="34" charset="0"/>
+              </a:rPr>
+            </a:br>
+            <a:r>
+              <a:rPr lang="pt-BR" i="0" dirty="0">
+                <a:effectLst/>
+                <a:latin typeface="Arial" panose="020B0604020202020204" pitchFamily="34" charset="0"/>
+                <a:cs typeface="Arial" panose="020B0604020202020204" pitchFamily="34" charset="0"/>
+              </a:rPr>
+              <a:t>externas aos casos de treinamento e teste? </a:t>
+            </a:r>
+          </a:p>
+          <a:p>
+            <a:pPr marL="457200" indent="-457200">
+              <a:buFont typeface="+mj-lt"/>
+              <a:buAutoNum type="arabicPeriod"/>
+            </a:pPr>
+            <a:endParaRPr lang="pt-BR" i="0" dirty="0">
+              <a:effectLst/>
+              <a:latin typeface="Arial" panose="020B0604020202020204" pitchFamily="34" charset="0"/>
+              <a:ea typeface="Calibri" panose="020F0502020204030204" pitchFamily="34" charset="0"/>
+              <a:cs typeface="Arial" panose="020B0604020202020204" pitchFamily="34" charset="0"/>
+            </a:endParaRPr>
+          </a:p>
+          <a:p>
+            <a:pPr marL="457200" indent="-457200">
+              <a:buFont typeface="+mj-lt"/>
+              <a:buAutoNum type="arabicPeriod"/>
+            </a:pPr>
+            <a:r>
+              <a:rPr lang="pt-BR" i="0" dirty="0">
+                <a:effectLst/>
+                <a:latin typeface="Arial" panose="020B0604020202020204" pitchFamily="34" charset="0"/>
+                <a:cs typeface="Arial" panose="020B0604020202020204" pitchFamily="34" charset="0"/>
+              </a:rPr>
+              <a:t>Existem características que desempenham maior impacto na predição da</a:t>
+            </a:r>
+            <a:br>
+              <a:rPr lang="pt-BR" dirty="0">
+                <a:latin typeface="Arial" panose="020B0604020202020204" pitchFamily="34" charset="0"/>
+                <a:cs typeface="Arial" panose="020B0604020202020204" pitchFamily="34" charset="0"/>
+              </a:rPr>
+            </a:br>
+            <a:r>
+              <a:rPr lang="pt-BR" i="0" dirty="0">
+                <a:effectLst/>
+                <a:latin typeface="Arial" panose="020B0604020202020204" pitchFamily="34" charset="0"/>
+                <a:cs typeface="Arial" panose="020B0604020202020204" pitchFamily="34" charset="0"/>
+              </a:rPr>
+              <a:t>causa da morte?</a:t>
+            </a:r>
+            <a:endParaRPr lang="pt-BR" dirty="0">
+              <a:latin typeface="Arial" panose="020B0604020202020204" pitchFamily="34" charset="0"/>
+              <a:ea typeface="Calibri" panose="020F0502020204030204" pitchFamily="34" charset="0"/>
+              <a:cs typeface="Arial" panose="020B0604020202020204" pitchFamily="34" charset="0"/>
+            </a:endParaRPr>
+          </a:p>
+        </p:txBody>
+      </p:sp>
+      <p:sp>
+        <p:nvSpPr>
+          <p:cNvPr id="13" name="CaixaDeTexto 12">
+            <a:extLst>
+              <a:ext uri="{FF2B5EF4-FFF2-40B4-BE49-F238E27FC236}">
+                <a16:creationId xmlns:a16="http://schemas.microsoft.com/office/drawing/2014/main" id="{3C0402FC-1B3C-3FE9-BC62-3B8C088DA97E}"/>
+              </a:ext>
+            </a:extLst>
+          </p:cNvPr>
+          <p:cNvSpPr txBox="1"/>
+          <p:nvPr/>
+        </p:nvSpPr>
+        <p:spPr>
+          <a:xfrm>
+            <a:off x="13527235" y="31859158"/>
+            <a:ext cx="12025312" cy="3416320"/>
+          </a:xfrm>
+          <a:prstGeom prst="rect">
+            <a:avLst/>
+          </a:prstGeom>
+          <a:noFill/>
+        </p:spPr>
+        <p:txBody>
+          <a:bodyPr wrap="square" rtlCol="0">
+            <a:spAutoFit/>
+          </a:bodyPr>
+          <a:lstStyle/>
+          <a:p>
+            <a:pPr marL="342900" indent="-342900">
+              <a:buFont typeface="Arial" panose="020B0604020202020204" pitchFamily="34" charset="0"/>
+              <a:buChar char="•"/>
+            </a:pPr>
+            <a:r>
+              <a:rPr lang="pt-BR" dirty="0">
+                <a:latin typeface="Arial" panose="020B0604020202020204" pitchFamily="34" charset="0"/>
+                <a:ea typeface="Calibri" panose="020F0502020204030204" pitchFamily="34" charset="0"/>
+                <a:cs typeface="Arial" panose="020B0604020202020204" pitchFamily="34" charset="0"/>
+              </a:rPr>
+              <a:t>É possível predizer, a partir do conjunto de </a:t>
+            </a:r>
+            <a:r>
+              <a:rPr lang="pt-BR" dirty="0" err="1">
+                <a:latin typeface="Arial" panose="020B0604020202020204" pitchFamily="34" charset="0"/>
+                <a:ea typeface="Calibri" panose="020F0502020204030204" pitchFamily="34" charset="0"/>
+                <a:cs typeface="Arial" panose="020B0604020202020204" pitchFamily="34" charset="0"/>
+              </a:rPr>
+              <a:t>features</a:t>
+            </a:r>
+            <a:r>
+              <a:rPr lang="pt-BR" dirty="0">
+                <a:latin typeface="Arial" panose="020B0604020202020204" pitchFamily="34" charset="0"/>
+                <a:ea typeface="Calibri" panose="020F0502020204030204" pitchFamily="34" charset="0"/>
+                <a:cs typeface="Arial" panose="020B0604020202020204" pitchFamily="34" charset="0"/>
+              </a:rPr>
+              <a:t> selecionado, a causa de óbito de um falecido</a:t>
+            </a:r>
+          </a:p>
+          <a:p>
+            <a:pPr marL="342900" indent="-342900">
+              <a:buFont typeface="Arial" panose="020B0604020202020204" pitchFamily="34" charset="0"/>
+              <a:buChar char="•"/>
+            </a:pPr>
+            <a:endParaRPr lang="pt-BR" dirty="0">
+              <a:latin typeface="Arial" panose="020B0604020202020204" pitchFamily="34" charset="0"/>
+              <a:ea typeface="Calibri" panose="020F0502020204030204" pitchFamily="34" charset="0"/>
+              <a:cs typeface="Arial" panose="020B0604020202020204" pitchFamily="34" charset="0"/>
+            </a:endParaRPr>
+          </a:p>
+          <a:p>
+            <a:pPr marL="342900" indent="-342900">
+              <a:buFont typeface="Arial" panose="020B0604020202020204" pitchFamily="34" charset="0"/>
+              <a:buChar char="•"/>
+            </a:pPr>
+            <a:r>
+              <a:rPr lang="pt-BR" dirty="0">
+                <a:latin typeface="Arial" panose="020B0604020202020204" pitchFamily="34" charset="0"/>
+                <a:ea typeface="Calibri" panose="020F0502020204030204" pitchFamily="34" charset="0"/>
+                <a:cs typeface="Arial" panose="020B0604020202020204" pitchFamily="34" charset="0"/>
+              </a:rPr>
+              <a:t>Os modelos desenvolvidos são capazes de generalizar os resultados obtidos para amostras aos casos de treinamento e teste, inclusive pode ser generalizado para outros estados da federação com características bem diferentes</a:t>
+            </a:r>
+          </a:p>
+          <a:p>
+            <a:pPr marL="342900" indent="-342900">
+              <a:buFont typeface="Arial" panose="020B0604020202020204" pitchFamily="34" charset="0"/>
+              <a:buChar char="•"/>
+            </a:pPr>
+            <a:endParaRPr lang="pt-BR" dirty="0">
+              <a:latin typeface="Arial" panose="020B0604020202020204" pitchFamily="34" charset="0"/>
+              <a:ea typeface="Calibri" panose="020F0502020204030204" pitchFamily="34" charset="0"/>
+              <a:cs typeface="Arial" panose="020B0604020202020204" pitchFamily="34" charset="0"/>
+            </a:endParaRPr>
+          </a:p>
+          <a:p>
+            <a:pPr marL="342900" indent="-342900">
+              <a:buFont typeface="Arial" panose="020B0604020202020204" pitchFamily="34" charset="0"/>
+              <a:buChar char="•"/>
+            </a:pPr>
+            <a:r>
+              <a:rPr lang="pt-BR" dirty="0">
+                <a:latin typeface="Arial" panose="020B0604020202020204" pitchFamily="34" charset="0"/>
+                <a:ea typeface="Calibri" panose="020F0502020204030204" pitchFamily="34" charset="0"/>
+                <a:cs typeface="Arial" panose="020B0604020202020204" pitchFamily="34" charset="0"/>
+              </a:rPr>
+              <a:t>O modelo gerado possui resultado semelhante para apenas 10% das </a:t>
+            </a:r>
+            <a:r>
+              <a:rPr lang="pt-BR" dirty="0" err="1">
+                <a:latin typeface="Arial" panose="020B0604020202020204" pitchFamily="34" charset="0"/>
+                <a:ea typeface="Calibri" panose="020F0502020204030204" pitchFamily="34" charset="0"/>
+                <a:cs typeface="Arial" panose="020B0604020202020204" pitchFamily="34" charset="0"/>
+              </a:rPr>
+              <a:t>features</a:t>
+            </a:r>
+            <a:r>
+              <a:rPr lang="pt-BR" dirty="0">
+                <a:latin typeface="Arial" panose="020B0604020202020204" pitchFamily="34" charset="0"/>
+                <a:ea typeface="Calibri" panose="020F0502020204030204" pitchFamily="34" charset="0"/>
+                <a:cs typeface="Arial" panose="020B0604020202020204" pitchFamily="34" charset="0"/>
+              </a:rPr>
+              <a:t> e a precisão acima desse valor não cresce de maneira relevante</a:t>
+            </a:r>
+          </a:p>
+        </p:txBody>
+      </p:sp>
+      <p:pic>
+        <p:nvPicPr>
+          <p:cNvPr id="17" name="Imagem 16" descr="Gráfico, Gráfico de linhas&#10;&#10;Descrição gerada automaticamente">
+            <a:extLst>
+              <a:ext uri="{FF2B5EF4-FFF2-40B4-BE49-F238E27FC236}">
+                <a16:creationId xmlns:a16="http://schemas.microsoft.com/office/drawing/2014/main" id="{73E99811-BAC5-D321-9C38-4DC2F9BD5766}"/>
+              </a:ext>
+            </a:extLst>
+          </p:cNvPr>
+          <p:cNvPicPr>
+            <a:picLocks noChangeAspect="1"/>
+          </p:cNvPicPr>
+          <p:nvPr/>
+        </p:nvPicPr>
+        <p:blipFill>
+          <a:blip r:embed="rId6" cstate="print">
+            <a:extLst>
+              <a:ext uri="{28A0092B-C50C-407E-A947-70E740481C1C}">
+                <a14:useLocalDpi xmlns:a14="http://schemas.microsoft.com/office/drawing/2010/main" val="0"/>
+              </a:ext>
+            </a:extLst>
+          </a:blip>
+          <a:stretch>
+            <a:fillRect/>
+          </a:stretch>
+        </p:blipFill>
+        <p:spPr>
+          <a:xfrm>
+            <a:off x="19771275" y="14957879"/>
+            <a:ext cx="6000000" cy="3600000"/>
+          </a:xfrm>
+          <a:prstGeom prst="rect">
+            <a:avLst/>
+          </a:prstGeom>
+        </p:spPr>
+      </p:pic>
+      <p:pic>
+        <p:nvPicPr>
+          <p:cNvPr id="19" name="Imagem 18" descr="Gráfico, Gráfico de linhas&#10;&#10;Descrição gerada automaticamente">
+            <a:extLst>
+              <a:ext uri="{FF2B5EF4-FFF2-40B4-BE49-F238E27FC236}">
+                <a16:creationId xmlns:a16="http://schemas.microsoft.com/office/drawing/2014/main" id="{69E8D6CA-43E9-6DF4-872F-6D0A48212D53}"/>
+              </a:ext>
+            </a:extLst>
+          </p:cNvPr>
+          <p:cNvPicPr>
+            <a:picLocks noChangeAspect="1"/>
+          </p:cNvPicPr>
+          <p:nvPr/>
+        </p:nvPicPr>
+        <p:blipFill>
+          <a:blip r:embed="rId7" cstate="print">
+            <a:extLst>
+              <a:ext uri="{28A0092B-C50C-407E-A947-70E740481C1C}">
+                <a14:useLocalDpi xmlns:a14="http://schemas.microsoft.com/office/drawing/2010/main" val="0"/>
+              </a:ext>
+            </a:extLst>
+          </a:blip>
+          <a:stretch>
+            <a:fillRect/>
+          </a:stretch>
+        </p:blipFill>
+        <p:spPr>
+          <a:xfrm>
+            <a:off x="13639071" y="14957879"/>
+            <a:ext cx="6000000" cy="3600000"/>
+          </a:xfrm>
+          <a:prstGeom prst="rect">
+            <a:avLst/>
+          </a:prstGeom>
+        </p:spPr>
+      </p:pic>
+      <p:pic>
+        <p:nvPicPr>
+          <p:cNvPr id="23" name="Imagem 22" descr="Gráfico&#10;&#10;Descrição gerada automaticamente">
+            <a:extLst>
+              <a:ext uri="{FF2B5EF4-FFF2-40B4-BE49-F238E27FC236}">
+                <a16:creationId xmlns:a16="http://schemas.microsoft.com/office/drawing/2014/main" id="{53C6B76B-21C5-92AB-8AD3-0C51F6222BD2}"/>
+              </a:ext>
+            </a:extLst>
+          </p:cNvPr>
+          <p:cNvPicPr>
+            <a:picLocks noChangeAspect="1"/>
+          </p:cNvPicPr>
+          <p:nvPr/>
+        </p:nvPicPr>
+        <p:blipFill>
+          <a:blip r:embed="rId8" cstate="print">
+            <a:extLst>
+              <a:ext uri="{28A0092B-C50C-407E-A947-70E740481C1C}">
+                <a14:useLocalDpi xmlns:a14="http://schemas.microsoft.com/office/drawing/2010/main" val="0"/>
+              </a:ext>
+            </a:extLst>
+          </a:blip>
+          <a:stretch>
+            <a:fillRect/>
+          </a:stretch>
+        </p:blipFill>
+        <p:spPr>
+          <a:xfrm>
+            <a:off x="14238991" y="20742450"/>
+            <a:ext cx="10800160" cy="6480096"/>
+          </a:xfrm>
+          <a:prstGeom prst="rect">
+            <a:avLst/>
+          </a:prstGeom>
+        </p:spPr>
+      </p:pic>
+      <p:pic>
+        <p:nvPicPr>
+          <p:cNvPr id="25" name="Imagem 24" descr="Gráfico, Gráfico de linhas&#10;&#10;Descrição gerada automaticamente">
+            <a:extLst>
+              <a:ext uri="{FF2B5EF4-FFF2-40B4-BE49-F238E27FC236}">
+                <a16:creationId xmlns:a16="http://schemas.microsoft.com/office/drawing/2014/main" id="{08E77E0D-F6C0-6678-6A01-41AAD7738359}"/>
+              </a:ext>
+            </a:extLst>
+          </p:cNvPr>
+          <p:cNvPicPr>
+            <a:picLocks noChangeAspect="1"/>
+          </p:cNvPicPr>
+          <p:nvPr/>
+        </p:nvPicPr>
+        <p:blipFill>
+          <a:blip r:embed="rId9" cstate="print">
+            <a:extLst>
+              <a:ext uri="{28A0092B-C50C-407E-A947-70E740481C1C}">
+                <a14:useLocalDpi xmlns:a14="http://schemas.microsoft.com/office/drawing/2010/main" val="0"/>
+              </a:ext>
+            </a:extLst>
+          </a:blip>
+          <a:stretch>
+            <a:fillRect/>
+          </a:stretch>
+        </p:blipFill>
+        <p:spPr>
+          <a:xfrm>
+            <a:off x="19807072" y="10030193"/>
+            <a:ext cx="6000000" cy="3600000"/>
+          </a:xfrm>
+          <a:prstGeom prst="rect">
+            <a:avLst/>
+          </a:prstGeom>
+        </p:spPr>
+      </p:pic>
+      <p:pic>
+        <p:nvPicPr>
+          <p:cNvPr id="27" name="Imagem 26" descr="Gráfico, Gráfico de linhas&#10;&#10;Descrição gerada automaticamente">
+            <a:extLst>
+              <a:ext uri="{FF2B5EF4-FFF2-40B4-BE49-F238E27FC236}">
+                <a16:creationId xmlns:a16="http://schemas.microsoft.com/office/drawing/2014/main" id="{F1FFC008-ECFE-1D87-8078-0476AA19FA4F}"/>
+              </a:ext>
+            </a:extLst>
+          </p:cNvPr>
+          <p:cNvPicPr>
+            <a:picLocks noChangeAspect="1"/>
+          </p:cNvPicPr>
+          <p:nvPr/>
+        </p:nvPicPr>
+        <p:blipFill>
+          <a:blip r:embed="rId10" cstate="print">
+            <a:extLst>
+              <a:ext uri="{28A0092B-C50C-407E-A947-70E740481C1C}">
+                <a14:useLocalDpi xmlns:a14="http://schemas.microsoft.com/office/drawing/2010/main" val="0"/>
+              </a:ext>
+            </a:extLst>
+          </a:blip>
+          <a:stretch>
+            <a:fillRect/>
+          </a:stretch>
+        </p:blipFill>
+        <p:spPr>
+          <a:xfrm>
+            <a:off x="13807072" y="10030193"/>
+            <a:ext cx="6000000" cy="3600000"/>
+          </a:xfrm>
+          <a:prstGeom prst="rect">
+            <a:avLst/>
+          </a:prstGeom>
+        </p:spPr>
+      </p:pic>
+      <p:sp>
+        <p:nvSpPr>
+          <p:cNvPr id="30" name="Text Box 10">
+            <a:extLst>
+              <a:ext uri="{FF2B5EF4-FFF2-40B4-BE49-F238E27FC236}">
+                <a16:creationId xmlns:a16="http://schemas.microsoft.com/office/drawing/2014/main" id="{8D7792C4-0E93-46D8-2F7C-16A124EEBD87}"/>
+              </a:ext>
+            </a:extLst>
+          </p:cNvPr>
+          <p:cNvSpPr txBox="1">
+            <a:spLocks noChangeArrowheads="1"/>
+          </p:cNvSpPr>
+          <p:nvPr/>
+        </p:nvSpPr>
+        <p:spPr bwMode="auto">
+          <a:xfrm>
+            <a:off x="1465369" y="36565546"/>
+            <a:ext cx="13165775" cy="1200329"/>
+          </a:xfrm>
+          <a:prstGeom prst="rect">
+            <a:avLst/>
+          </a:prstGeom>
+          <a:noFill/>
+          <a:ln>
+            <a:noFill/>
+          </a:ln>
+          <a:effectLst/>
+          <a:extLst>
+            <a:ext uri="{909E8E84-426E-40DD-AFC4-6F175D3DCCD1}">
+              <a14:hiddenFill xmlns:a14="http://schemas.microsoft.com/office/drawing/2010/main">
+                <a:solidFill>
+                  <a:schemeClr val="accent1"/>
+                </a:solidFill>
+              </a14:hiddenFill>
+            </a:ext>
+            <a:ext uri="{91240B29-F687-4F45-9708-019B960494DF}">
+              <a14:hiddenLine xmlns:a14="http://schemas.microsoft.com/office/drawing/2010/main" w="9525">
+                <a:solidFill>
+                  <a:schemeClr val="tx1"/>
+                </a:solidFill>
+                <a:miter lim="800000"/>
+                <a:headEnd/>
+                <a:tailEnd/>
+              </a14:hiddenLine>
+            </a:ext>
+            <a:ext uri="{AF507438-7753-43E0-B8FC-AC1667EBCBE1}">
+              <a14:hiddenEffects xmlns:a14="http://schemas.microsoft.com/office/drawing/2010/main">
+                <a:effectLst>
+                  <a:outerShdw dist="35921" dir="2700000" algn="ctr" rotWithShape="0">
+                    <a:schemeClr val="bg2"/>
+                  </a:outerShdw>
+                </a:effectLst>
+              </a14:hiddenEffects>
+            </a:ext>
+          </a:extLst>
+        </p:spPr>
+        <p:txBody>
+          <a:bodyPr wrap="square">
+            <a:spAutoFit/>
+          </a:bodyPr>
+          <a:lstStyle/>
+          <a:p>
+            <a:pPr>
+              <a:lnSpc>
+                <a:spcPct val="90000"/>
+              </a:lnSpc>
+            </a:pPr>
+            <a:r>
+              <a:rPr lang="pt-BR" altLang="pt-BR" sz="4000" dirty="0">
+                <a:solidFill>
+                  <a:srgbClr val="6600FF"/>
+                </a:solidFill>
+                <a:latin typeface="Arial" panose="020B0604020202020204" pitchFamily="34" charset="0"/>
+                <a:cs typeface="Arial" panose="020B0604020202020204" pitchFamily="34" charset="0"/>
+              </a:rPr>
+              <a:t>Integrantes: </a:t>
+            </a:r>
+            <a:r>
+              <a:rPr lang="en-US" sz="4000" dirty="0">
+                <a:latin typeface="Arial" panose="020B0604020202020204" pitchFamily="34" charset="0"/>
+                <a:ea typeface="Tahoma" pitchFamily="34" charset="0"/>
+                <a:cs typeface="Arial" panose="020B0604020202020204" pitchFamily="34" charset="0"/>
+              </a:rPr>
+              <a:t>Filipe Penna </a:t>
+            </a:r>
+            <a:r>
+              <a:rPr lang="en-US" sz="4000" dirty="0" err="1">
+                <a:latin typeface="Arial" panose="020B0604020202020204" pitchFamily="34" charset="0"/>
+                <a:ea typeface="Tahoma" pitchFamily="34" charset="0"/>
+                <a:cs typeface="Arial" panose="020B0604020202020204" pitchFamily="34" charset="0"/>
+              </a:rPr>
+              <a:t>Cerávolo</a:t>
+            </a:r>
+            <a:r>
+              <a:rPr lang="en-US" sz="4000" dirty="0">
+                <a:latin typeface="Arial" panose="020B0604020202020204" pitchFamily="34" charset="0"/>
+                <a:ea typeface="Tahoma" pitchFamily="34" charset="0"/>
+                <a:cs typeface="Arial" panose="020B0604020202020204" pitchFamily="34" charset="0"/>
+              </a:rPr>
+              <a:t> Soares</a:t>
+            </a:r>
+          </a:p>
+          <a:p>
+            <a:pPr>
+              <a:lnSpc>
+                <a:spcPct val="90000"/>
+              </a:lnSpc>
+            </a:pPr>
+            <a:r>
+              <a:rPr lang="pt-BR" altLang="pt-BR" sz="4000" dirty="0">
+                <a:solidFill>
+                  <a:srgbClr val="6600FF"/>
+                </a:solidFill>
+                <a:latin typeface="Arial" panose="020B0604020202020204" pitchFamily="34" charset="0"/>
+                <a:cs typeface="Arial" panose="020B0604020202020204" pitchFamily="34" charset="0"/>
+              </a:rPr>
+              <a:t>Professor(a) Orientador(a): </a:t>
+            </a:r>
+            <a:r>
+              <a:rPr lang="pt-BR" sz="4000" dirty="0">
+                <a:latin typeface="Arial" panose="020B0604020202020204" pitchFamily="34" charset="0"/>
+                <a:ea typeface="Tahoma" pitchFamily="34" charset="0"/>
+                <a:cs typeface="Arial" panose="020B0604020202020204" pitchFamily="34" charset="0"/>
+              </a:rPr>
+              <a:t>Prof. Dr. Arthur Jordão</a:t>
+            </a:r>
+            <a:endParaRPr lang="pt-BR" altLang="pt-BR" sz="4000" dirty="0">
+              <a:solidFill>
+                <a:srgbClr val="6600FF"/>
+              </a:solidFill>
+              <a:latin typeface="Arial" panose="020B0604020202020204" pitchFamily="34" charset="0"/>
+              <a:cs typeface="Arial" panose="020B0604020202020204" pitchFamily="34" charset="0"/>
+            </a:endParaRPr>
+          </a:p>
+        </p:txBody>
+      </p:sp>
+      <p:sp>
+        <p:nvSpPr>
+          <p:cNvPr id="34" name="TextBox 13">
+            <a:extLst>
+              <a:ext uri="{FF2B5EF4-FFF2-40B4-BE49-F238E27FC236}">
+                <a16:creationId xmlns:a16="http://schemas.microsoft.com/office/drawing/2014/main" id="{EEC01FD8-22E4-566F-88AB-58A35B8959F7}"/>
+              </a:ext>
+            </a:extLst>
+          </p:cNvPr>
+          <p:cNvSpPr txBox="1"/>
+          <p:nvPr/>
+        </p:nvSpPr>
+        <p:spPr>
+          <a:xfrm>
+            <a:off x="248198" y="40144278"/>
+            <a:ext cx="29331234" cy="769441"/>
+          </a:xfrm>
+          <a:prstGeom prst="rect">
+            <a:avLst/>
+          </a:prstGeom>
+          <a:solidFill>
+            <a:schemeClr val="tx1"/>
+          </a:solidFill>
+          <a:ln w="3175">
+            <a:solidFill>
+              <a:schemeClr val="tx1"/>
+            </a:solidFill>
+          </a:ln>
+        </p:spPr>
+        <p:txBody>
+          <a:bodyPr wrap="square" rtlCol="0">
+            <a:spAutoFit/>
+          </a:bodyPr>
+          <a:lstStyle>
+            <a:defPPr>
+              <a:defRPr lang="en-US"/>
+            </a:defPPr>
+            <a:lvl1pPr marL="0" algn="l" defTabSz="3907381" rtl="0" eaLnBrk="1" latinLnBrk="0" hangingPunct="1">
+              <a:defRPr sz="7693" kern="1200">
+                <a:solidFill>
+                  <a:schemeClr val="tx1"/>
+                </a:solidFill>
+                <a:latin typeface="+mn-lt"/>
+                <a:ea typeface="+mn-ea"/>
+                <a:cs typeface="+mn-cs"/>
+              </a:defRPr>
+            </a:lvl1pPr>
+            <a:lvl2pPr marL="1953690" algn="l" defTabSz="3907381" rtl="0" eaLnBrk="1" latinLnBrk="0" hangingPunct="1">
+              <a:defRPr sz="7693" kern="1200">
+                <a:solidFill>
+                  <a:schemeClr val="tx1"/>
+                </a:solidFill>
+                <a:latin typeface="+mn-lt"/>
+                <a:ea typeface="+mn-ea"/>
+                <a:cs typeface="+mn-cs"/>
+              </a:defRPr>
+            </a:lvl2pPr>
+            <a:lvl3pPr marL="3907381" algn="l" defTabSz="3907381" rtl="0" eaLnBrk="1" latinLnBrk="0" hangingPunct="1">
+              <a:defRPr sz="7693" kern="1200">
+                <a:solidFill>
+                  <a:schemeClr val="tx1"/>
+                </a:solidFill>
+                <a:latin typeface="+mn-lt"/>
+                <a:ea typeface="+mn-ea"/>
+                <a:cs typeface="+mn-cs"/>
+              </a:defRPr>
+            </a:lvl3pPr>
+            <a:lvl4pPr marL="5861070" algn="l" defTabSz="3907381" rtl="0" eaLnBrk="1" latinLnBrk="0" hangingPunct="1">
+              <a:defRPr sz="7693" kern="1200">
+                <a:solidFill>
+                  <a:schemeClr val="tx1"/>
+                </a:solidFill>
+                <a:latin typeface="+mn-lt"/>
+                <a:ea typeface="+mn-ea"/>
+                <a:cs typeface="+mn-cs"/>
+              </a:defRPr>
+            </a:lvl4pPr>
+            <a:lvl5pPr marL="7814760" algn="l" defTabSz="3907381" rtl="0" eaLnBrk="1" latinLnBrk="0" hangingPunct="1">
+              <a:defRPr sz="7693" kern="1200">
+                <a:solidFill>
+                  <a:schemeClr val="tx1"/>
+                </a:solidFill>
+                <a:latin typeface="+mn-lt"/>
+                <a:ea typeface="+mn-ea"/>
+                <a:cs typeface="+mn-cs"/>
+              </a:defRPr>
+            </a:lvl5pPr>
+            <a:lvl6pPr marL="9768454" algn="l" defTabSz="3907381" rtl="0" eaLnBrk="1" latinLnBrk="0" hangingPunct="1">
+              <a:defRPr sz="7693" kern="1200">
+                <a:solidFill>
+                  <a:schemeClr val="tx1"/>
+                </a:solidFill>
+                <a:latin typeface="+mn-lt"/>
+                <a:ea typeface="+mn-ea"/>
+                <a:cs typeface="+mn-cs"/>
+              </a:defRPr>
+            </a:lvl6pPr>
+            <a:lvl7pPr marL="11722143" algn="l" defTabSz="3907381" rtl="0" eaLnBrk="1" latinLnBrk="0" hangingPunct="1">
+              <a:defRPr sz="7693" kern="1200">
+                <a:solidFill>
+                  <a:schemeClr val="tx1"/>
+                </a:solidFill>
+                <a:latin typeface="+mn-lt"/>
+                <a:ea typeface="+mn-ea"/>
+                <a:cs typeface="+mn-cs"/>
+              </a:defRPr>
+            </a:lvl7pPr>
+            <a:lvl8pPr marL="13675833" algn="l" defTabSz="3907381" rtl="0" eaLnBrk="1" latinLnBrk="0" hangingPunct="1">
+              <a:defRPr sz="7693" kern="1200">
+                <a:solidFill>
+                  <a:schemeClr val="tx1"/>
+                </a:solidFill>
+                <a:latin typeface="+mn-lt"/>
+                <a:ea typeface="+mn-ea"/>
+                <a:cs typeface="+mn-cs"/>
+              </a:defRPr>
+            </a:lvl8pPr>
+            <a:lvl9pPr marL="15629523" algn="l" defTabSz="3907381" rtl="0" eaLnBrk="1" latinLnBrk="0" hangingPunct="1">
+              <a:defRPr sz="7693" kern="1200">
+                <a:solidFill>
+                  <a:schemeClr val="tx1"/>
+                </a:solidFill>
+                <a:latin typeface="+mn-lt"/>
+                <a:ea typeface="+mn-ea"/>
+                <a:cs typeface="+mn-cs"/>
+              </a:defRPr>
+            </a:lvl9pPr>
+          </a:lstStyle>
+          <a:p>
+            <a:pPr algn="ctr"/>
+            <a:r>
+              <a:rPr lang="en-US" sz="4400" b="1" dirty="0">
+                <a:solidFill>
+                  <a:schemeClr val="bg1"/>
+                </a:solidFill>
+                <a:latin typeface="Arial" panose="020B0604020202020204" pitchFamily="34" charset="0"/>
+                <a:cs typeface="Arial" panose="020B0604020202020204" pitchFamily="34" charset="0"/>
+              </a:rPr>
+              <a:t>References</a:t>
+            </a:r>
+          </a:p>
+        </p:txBody>
+      </p:sp>
+      <p:sp>
+        <p:nvSpPr>
+          <p:cNvPr id="36" name="CaixaDeTexto 35">
+            <a:extLst>
+              <a:ext uri="{FF2B5EF4-FFF2-40B4-BE49-F238E27FC236}">
+                <a16:creationId xmlns:a16="http://schemas.microsoft.com/office/drawing/2014/main" id="{CE9DEEDE-9080-216B-A503-F5AA4F00EB65}"/>
+              </a:ext>
+            </a:extLst>
+          </p:cNvPr>
+          <p:cNvSpPr txBox="1"/>
+          <p:nvPr/>
+        </p:nvSpPr>
+        <p:spPr>
+          <a:xfrm>
+            <a:off x="13616071" y="8921497"/>
+            <a:ext cx="12025312" cy="830997"/>
+          </a:xfrm>
+          <a:prstGeom prst="rect">
+            <a:avLst/>
+          </a:prstGeom>
+          <a:noFill/>
+        </p:spPr>
+        <p:txBody>
+          <a:bodyPr wrap="square" rtlCol="0">
+            <a:spAutoFit/>
+          </a:bodyPr>
+          <a:lstStyle/>
+          <a:p>
+            <a:pPr marL="342900" indent="-342900">
+              <a:buFont typeface="Arial" panose="020B0604020202020204" pitchFamily="34" charset="0"/>
+              <a:buChar char="•"/>
+            </a:pPr>
+            <a:r>
+              <a:rPr lang="pt-BR" dirty="0">
+                <a:latin typeface="Arial" panose="020B0604020202020204" pitchFamily="34" charset="0"/>
+                <a:ea typeface="Calibri" panose="020F0502020204030204" pitchFamily="34" charset="0"/>
+                <a:cs typeface="Arial" panose="020B0604020202020204" pitchFamily="34" charset="0"/>
+              </a:rPr>
+              <a:t>Teste de diferentes modelos: modelos baseados na técnica de </a:t>
+            </a:r>
+            <a:r>
+              <a:rPr lang="pt-BR" i="1" dirty="0" err="1">
+                <a:latin typeface="Arial" panose="020B0604020202020204" pitchFamily="34" charset="0"/>
+                <a:ea typeface="Calibri" panose="020F0502020204030204" pitchFamily="34" charset="0"/>
+                <a:cs typeface="Arial" panose="020B0604020202020204" pitchFamily="34" charset="0"/>
+              </a:rPr>
+              <a:t>boosting</a:t>
+            </a:r>
+            <a:r>
+              <a:rPr lang="pt-BR" dirty="0">
+                <a:latin typeface="Arial" panose="020B0604020202020204" pitchFamily="34" charset="0"/>
+                <a:ea typeface="Calibri" panose="020F0502020204030204" pitchFamily="34" charset="0"/>
+                <a:cs typeface="Arial" panose="020B0604020202020204" pitchFamily="34" charset="0"/>
+              </a:rPr>
+              <a:t> performaram melhor</a:t>
+            </a:r>
+          </a:p>
+        </p:txBody>
+      </p:sp>
+      <p:sp>
+        <p:nvSpPr>
+          <p:cNvPr id="37" name="TextBox 13">
+            <a:extLst>
+              <a:ext uri="{FF2B5EF4-FFF2-40B4-BE49-F238E27FC236}">
+                <a16:creationId xmlns:a16="http://schemas.microsoft.com/office/drawing/2014/main" id="{1E1CC1FC-CF58-B76D-D811-8A3C71EB3E72}"/>
+              </a:ext>
+            </a:extLst>
+          </p:cNvPr>
+          <p:cNvSpPr txBox="1"/>
+          <p:nvPr/>
+        </p:nvSpPr>
+        <p:spPr>
+          <a:xfrm>
+            <a:off x="1309664" y="30830127"/>
+            <a:ext cx="12025336" cy="769441"/>
+          </a:xfrm>
+          <a:prstGeom prst="rect">
+            <a:avLst/>
+          </a:prstGeom>
+          <a:solidFill>
+            <a:schemeClr val="tx1"/>
+          </a:solidFill>
+          <a:ln w="3175">
+            <a:solidFill>
+              <a:schemeClr val="tx1"/>
+            </a:solidFill>
+          </a:ln>
+        </p:spPr>
+        <p:txBody>
+          <a:bodyPr wrap="square" rtlCol="0">
+            <a:spAutoFit/>
+          </a:bodyPr>
+          <a:lstStyle>
+            <a:defPPr>
+              <a:defRPr lang="en-US"/>
+            </a:defPPr>
+            <a:lvl1pPr marL="0" algn="l" defTabSz="3907381" rtl="0" eaLnBrk="1" latinLnBrk="0" hangingPunct="1">
+              <a:defRPr sz="7693" kern="1200">
+                <a:solidFill>
+                  <a:schemeClr val="tx1"/>
+                </a:solidFill>
+                <a:latin typeface="+mn-lt"/>
+                <a:ea typeface="+mn-ea"/>
+                <a:cs typeface="+mn-cs"/>
+              </a:defRPr>
+            </a:lvl1pPr>
+            <a:lvl2pPr marL="1953690" algn="l" defTabSz="3907381" rtl="0" eaLnBrk="1" latinLnBrk="0" hangingPunct="1">
+              <a:defRPr sz="7693" kern="1200">
+                <a:solidFill>
+                  <a:schemeClr val="tx1"/>
+                </a:solidFill>
+                <a:latin typeface="+mn-lt"/>
+                <a:ea typeface="+mn-ea"/>
+                <a:cs typeface="+mn-cs"/>
+              </a:defRPr>
+            </a:lvl2pPr>
+            <a:lvl3pPr marL="3907381" algn="l" defTabSz="3907381" rtl="0" eaLnBrk="1" latinLnBrk="0" hangingPunct="1">
+              <a:defRPr sz="7693" kern="1200">
+                <a:solidFill>
+                  <a:schemeClr val="tx1"/>
+                </a:solidFill>
+                <a:latin typeface="+mn-lt"/>
+                <a:ea typeface="+mn-ea"/>
+                <a:cs typeface="+mn-cs"/>
+              </a:defRPr>
+            </a:lvl3pPr>
+            <a:lvl4pPr marL="5861070" algn="l" defTabSz="3907381" rtl="0" eaLnBrk="1" latinLnBrk="0" hangingPunct="1">
+              <a:defRPr sz="7693" kern="1200">
+                <a:solidFill>
+                  <a:schemeClr val="tx1"/>
+                </a:solidFill>
+                <a:latin typeface="+mn-lt"/>
+                <a:ea typeface="+mn-ea"/>
+                <a:cs typeface="+mn-cs"/>
+              </a:defRPr>
+            </a:lvl4pPr>
+            <a:lvl5pPr marL="7814760" algn="l" defTabSz="3907381" rtl="0" eaLnBrk="1" latinLnBrk="0" hangingPunct="1">
+              <a:defRPr sz="7693" kern="1200">
+                <a:solidFill>
+                  <a:schemeClr val="tx1"/>
+                </a:solidFill>
+                <a:latin typeface="+mn-lt"/>
+                <a:ea typeface="+mn-ea"/>
+                <a:cs typeface="+mn-cs"/>
+              </a:defRPr>
+            </a:lvl5pPr>
+            <a:lvl6pPr marL="9768454" algn="l" defTabSz="3907381" rtl="0" eaLnBrk="1" latinLnBrk="0" hangingPunct="1">
+              <a:defRPr sz="7693" kern="1200">
+                <a:solidFill>
+                  <a:schemeClr val="tx1"/>
+                </a:solidFill>
+                <a:latin typeface="+mn-lt"/>
+                <a:ea typeface="+mn-ea"/>
+                <a:cs typeface="+mn-cs"/>
+              </a:defRPr>
+            </a:lvl6pPr>
+            <a:lvl7pPr marL="11722143" algn="l" defTabSz="3907381" rtl="0" eaLnBrk="1" latinLnBrk="0" hangingPunct="1">
+              <a:defRPr sz="7693" kern="1200">
+                <a:solidFill>
+                  <a:schemeClr val="tx1"/>
+                </a:solidFill>
+                <a:latin typeface="+mn-lt"/>
+                <a:ea typeface="+mn-ea"/>
+                <a:cs typeface="+mn-cs"/>
+              </a:defRPr>
+            </a:lvl7pPr>
+            <a:lvl8pPr marL="13675833" algn="l" defTabSz="3907381" rtl="0" eaLnBrk="1" latinLnBrk="0" hangingPunct="1">
+              <a:defRPr sz="7693" kern="1200">
+                <a:solidFill>
+                  <a:schemeClr val="tx1"/>
+                </a:solidFill>
+                <a:latin typeface="+mn-lt"/>
+                <a:ea typeface="+mn-ea"/>
+                <a:cs typeface="+mn-cs"/>
+              </a:defRPr>
+            </a:lvl8pPr>
+            <a:lvl9pPr marL="15629523" algn="l" defTabSz="3907381" rtl="0" eaLnBrk="1" latinLnBrk="0" hangingPunct="1">
+              <a:defRPr sz="7693" kern="1200">
+                <a:solidFill>
+                  <a:schemeClr val="tx1"/>
+                </a:solidFill>
+                <a:latin typeface="+mn-lt"/>
+                <a:ea typeface="+mn-ea"/>
+                <a:cs typeface="+mn-cs"/>
+              </a:defRPr>
+            </a:lvl9pPr>
+          </a:lstStyle>
+          <a:p>
+            <a:pPr algn="ctr"/>
+            <a:r>
+              <a:rPr lang="en-US" sz="4400" b="1" dirty="0" err="1">
+                <a:solidFill>
+                  <a:schemeClr val="bg1"/>
+                </a:solidFill>
+                <a:latin typeface="Arial" panose="020B0604020202020204" pitchFamily="34" charset="0"/>
+                <a:cs typeface="Arial" panose="020B0604020202020204" pitchFamily="34" charset="0"/>
+              </a:rPr>
+              <a:t>Experimentos</a:t>
+            </a:r>
+            <a:r>
+              <a:rPr lang="en-US" sz="4400" b="1" dirty="0">
+                <a:solidFill>
+                  <a:schemeClr val="bg1"/>
+                </a:solidFill>
+                <a:latin typeface="Arial" panose="020B0604020202020204" pitchFamily="34" charset="0"/>
+                <a:cs typeface="Arial" panose="020B0604020202020204" pitchFamily="34" charset="0"/>
+              </a:rPr>
+              <a:t> (1/2)</a:t>
+            </a:r>
+          </a:p>
+        </p:txBody>
+      </p:sp>
+      <p:sp>
+        <p:nvSpPr>
+          <p:cNvPr id="38" name="CaixaDeTexto 37">
+            <a:extLst>
+              <a:ext uri="{FF2B5EF4-FFF2-40B4-BE49-F238E27FC236}">
+                <a16:creationId xmlns:a16="http://schemas.microsoft.com/office/drawing/2014/main" id="{7A8EEA5F-3EBA-C486-6B8D-49E85CEDC90E}"/>
+              </a:ext>
+            </a:extLst>
+          </p:cNvPr>
+          <p:cNvSpPr txBox="1"/>
+          <p:nvPr/>
+        </p:nvSpPr>
+        <p:spPr>
+          <a:xfrm>
+            <a:off x="1250362" y="32108250"/>
+            <a:ext cx="6041296" cy="1938992"/>
+          </a:xfrm>
+          <a:prstGeom prst="rect">
+            <a:avLst/>
+          </a:prstGeom>
+          <a:noFill/>
+        </p:spPr>
+        <p:txBody>
+          <a:bodyPr wrap="square" rtlCol="0">
+            <a:spAutoFit/>
+          </a:bodyPr>
+          <a:lstStyle/>
+          <a:p>
+            <a:pPr marL="342900" indent="-342900">
+              <a:buFont typeface="Arial" panose="020B0604020202020204" pitchFamily="34" charset="0"/>
+              <a:buChar char="•"/>
+            </a:pPr>
+            <a:r>
+              <a:rPr lang="pt-BR" dirty="0">
+                <a:latin typeface="Arial" panose="020B0604020202020204" pitchFamily="34" charset="0"/>
+                <a:ea typeface="Calibri" panose="020F0502020204030204" pitchFamily="34" charset="0"/>
+                <a:cs typeface="Arial" panose="020B0604020202020204" pitchFamily="34" charset="0"/>
+              </a:rPr>
+              <a:t>Um modelo com </a:t>
+            </a:r>
+            <a:r>
+              <a:rPr lang="pt-BR" dirty="0" err="1">
+                <a:latin typeface="Arial" panose="020B0604020202020204" pitchFamily="34" charset="0"/>
+                <a:ea typeface="Calibri" panose="020F0502020204030204" pitchFamily="34" charset="0"/>
+                <a:cs typeface="Arial" panose="020B0604020202020204" pitchFamily="34" charset="0"/>
+              </a:rPr>
+              <a:t>XGBoosting</a:t>
+            </a:r>
+            <a:r>
+              <a:rPr lang="pt-BR" dirty="0">
+                <a:latin typeface="Arial" panose="020B0604020202020204" pitchFamily="34" charset="0"/>
+                <a:ea typeface="Calibri" panose="020F0502020204030204" pitchFamily="34" charset="0"/>
+                <a:cs typeface="Arial" panose="020B0604020202020204" pitchFamily="34" charset="0"/>
+              </a:rPr>
+              <a:t> é capaz de prever as categorias com uma precisão de 28,45%, ~3x acima do palpite aleatório (9,09%) e mais de 53,27% para o top-3</a:t>
+            </a:r>
+          </a:p>
+        </p:txBody>
+      </p:sp>
+      <p:pic>
+        <p:nvPicPr>
+          <p:cNvPr id="40" name="Imagem 39" descr="Gráfico, Gráfico de linhas&#10;&#10;Descrição gerada automaticamente">
+            <a:extLst>
+              <a:ext uri="{FF2B5EF4-FFF2-40B4-BE49-F238E27FC236}">
+                <a16:creationId xmlns:a16="http://schemas.microsoft.com/office/drawing/2014/main" id="{40EBEDAC-D1AB-2A00-9E8D-D07F293D91F0}"/>
+              </a:ext>
+            </a:extLst>
+          </p:cNvPr>
+          <p:cNvPicPr>
+            <a:picLocks noChangeAspect="1"/>
+          </p:cNvPicPr>
+          <p:nvPr/>
+        </p:nvPicPr>
+        <p:blipFill>
+          <a:blip r:embed="rId11" cstate="print">
+            <a:extLst>
+              <a:ext uri="{28A0092B-C50C-407E-A947-70E740481C1C}">
+                <a14:useLocalDpi xmlns:a14="http://schemas.microsoft.com/office/drawing/2010/main" val="0"/>
+              </a:ext>
+            </a:extLst>
+          </a:blip>
+          <a:stretch>
+            <a:fillRect/>
+          </a:stretch>
+        </p:blipFill>
+        <p:spPr>
+          <a:xfrm>
+            <a:off x="7291657" y="31966441"/>
+            <a:ext cx="6000001" cy="3600000"/>
+          </a:xfrm>
+          <a:prstGeom prst="rect">
+            <a:avLst/>
+          </a:prstGeom>
+        </p:spPr>
+      </p:pic>
+      <p:sp>
+        <p:nvSpPr>
+          <p:cNvPr id="41" name="CaixaDeTexto 40">
+            <a:extLst>
+              <a:ext uri="{FF2B5EF4-FFF2-40B4-BE49-F238E27FC236}">
+                <a16:creationId xmlns:a16="http://schemas.microsoft.com/office/drawing/2014/main" id="{166F6A2F-1F11-E619-A99F-545E7B915E5F}"/>
+              </a:ext>
+            </a:extLst>
+          </p:cNvPr>
+          <p:cNvSpPr txBox="1"/>
+          <p:nvPr/>
+        </p:nvSpPr>
+        <p:spPr>
+          <a:xfrm>
+            <a:off x="13616071" y="13836569"/>
+            <a:ext cx="12025312" cy="830997"/>
+          </a:xfrm>
+          <a:prstGeom prst="rect">
+            <a:avLst/>
+          </a:prstGeom>
+          <a:noFill/>
+        </p:spPr>
+        <p:txBody>
+          <a:bodyPr wrap="square" rtlCol="0">
+            <a:spAutoFit/>
+          </a:bodyPr>
+          <a:lstStyle/>
+          <a:p>
+            <a:pPr marL="342900" indent="-342900">
+              <a:buFont typeface="Arial" panose="020B0604020202020204" pitchFamily="34" charset="0"/>
+              <a:buChar char="•"/>
+            </a:pPr>
+            <a:r>
+              <a:rPr lang="pt-BR" dirty="0">
+                <a:latin typeface="Arial" panose="020B0604020202020204" pitchFamily="34" charset="0"/>
+                <a:ea typeface="Calibri" panose="020F0502020204030204" pitchFamily="34" charset="0"/>
+                <a:cs typeface="Arial" panose="020B0604020202020204" pitchFamily="34" charset="0"/>
+              </a:rPr>
+              <a:t>Seleção de </a:t>
+            </a:r>
+            <a:r>
+              <a:rPr lang="pt-BR" i="1" dirty="0" err="1">
+                <a:latin typeface="Arial" panose="020B0604020202020204" pitchFamily="34" charset="0"/>
+                <a:ea typeface="Calibri" panose="020F0502020204030204" pitchFamily="34" charset="0"/>
+                <a:cs typeface="Arial" panose="020B0604020202020204" pitchFamily="34" charset="0"/>
+              </a:rPr>
+              <a:t>features</a:t>
+            </a:r>
+            <a:r>
+              <a:rPr lang="pt-BR" dirty="0">
+                <a:latin typeface="Arial" panose="020B0604020202020204" pitchFamily="34" charset="0"/>
+                <a:ea typeface="Calibri" panose="020F0502020204030204" pitchFamily="34" charset="0"/>
+                <a:cs typeface="Arial" panose="020B0604020202020204" pitchFamily="34" charset="0"/>
+              </a:rPr>
+              <a:t>: a precisão e a precisão top-3 varia muito pouco com o aumento  da porcentagem das </a:t>
+            </a:r>
+            <a:r>
+              <a:rPr lang="pt-BR" dirty="0" err="1">
+                <a:latin typeface="Arial" panose="020B0604020202020204" pitchFamily="34" charset="0"/>
+                <a:ea typeface="Calibri" panose="020F0502020204030204" pitchFamily="34" charset="0"/>
+                <a:cs typeface="Arial" panose="020B0604020202020204" pitchFamily="34" charset="0"/>
+              </a:rPr>
+              <a:t>features</a:t>
+            </a:r>
+            <a:r>
+              <a:rPr lang="pt-BR" dirty="0">
+                <a:latin typeface="Arial" panose="020B0604020202020204" pitchFamily="34" charset="0"/>
+                <a:ea typeface="Calibri" panose="020F0502020204030204" pitchFamily="34" charset="0"/>
+                <a:cs typeface="Arial" panose="020B0604020202020204" pitchFamily="34" charset="0"/>
+              </a:rPr>
+              <a:t> selecionadas </a:t>
+            </a:r>
+          </a:p>
+        </p:txBody>
+      </p:sp>
+      <p:sp>
+        <p:nvSpPr>
+          <p:cNvPr id="42" name="CaixaDeTexto 41">
+            <a:extLst>
+              <a:ext uri="{FF2B5EF4-FFF2-40B4-BE49-F238E27FC236}">
+                <a16:creationId xmlns:a16="http://schemas.microsoft.com/office/drawing/2014/main" id="{465CF1E5-C8B7-5502-F604-C4D0581B1CE3}"/>
+              </a:ext>
+            </a:extLst>
+          </p:cNvPr>
+          <p:cNvSpPr txBox="1"/>
+          <p:nvPr/>
+        </p:nvSpPr>
+        <p:spPr>
+          <a:xfrm>
+            <a:off x="13616071" y="19050000"/>
+            <a:ext cx="12025312" cy="1200329"/>
+          </a:xfrm>
+          <a:prstGeom prst="rect">
+            <a:avLst/>
+          </a:prstGeom>
+          <a:noFill/>
+        </p:spPr>
+        <p:txBody>
+          <a:bodyPr wrap="square" rtlCol="0">
+            <a:spAutoFit/>
+          </a:bodyPr>
+          <a:lstStyle/>
+          <a:p>
+            <a:pPr marL="342900" indent="-342900">
+              <a:buFont typeface="Arial" panose="020B0604020202020204" pitchFamily="34" charset="0"/>
+              <a:buChar char="•"/>
+            </a:pPr>
+            <a:r>
+              <a:rPr lang="pt-BR" dirty="0">
+                <a:latin typeface="Arial" panose="020B0604020202020204" pitchFamily="34" charset="0"/>
+                <a:ea typeface="Calibri" panose="020F0502020204030204" pitchFamily="34" charset="0"/>
+                <a:cs typeface="Arial" panose="020B0604020202020204" pitchFamily="34" charset="0"/>
+              </a:rPr>
+              <a:t>Teste em diferentes amostras: o modelo encontra uma precisão próxima do estado de São Paulo em 3 dos 4 estados avaliados, o que sugere que o modelo pode ser extrapolado a amostras fora do conjunto de treinamento e testes</a:t>
+            </a:r>
+          </a:p>
+        </p:txBody>
+      </p:sp>
+      <p:pic>
+        <p:nvPicPr>
+          <p:cNvPr id="44" name="Imagem 43">
+            <a:extLst>
+              <a:ext uri="{FF2B5EF4-FFF2-40B4-BE49-F238E27FC236}">
+                <a16:creationId xmlns:a16="http://schemas.microsoft.com/office/drawing/2014/main" id="{E02CF2BB-6FD1-C3D0-8938-B70F0356D8C1}"/>
+              </a:ext>
+            </a:extLst>
+          </p:cNvPr>
+          <p:cNvPicPr>
+            <a:picLocks noChangeAspect="1"/>
+          </p:cNvPicPr>
+          <p:nvPr/>
+        </p:nvPicPr>
+        <p:blipFill>
+          <a:blip r:embed="rId12"/>
+          <a:stretch>
+            <a:fillRect/>
+          </a:stretch>
+        </p:blipFill>
+        <p:spPr>
+          <a:xfrm>
+            <a:off x="15917565" y="27275996"/>
+            <a:ext cx="7443011" cy="2652031"/>
+          </a:xfrm>
+          <a:prstGeom prst="rect">
+            <a:avLst/>
+          </a:prstGeom>
+        </p:spPr>
+      </p:pic>
+      <p:sp>
+        <p:nvSpPr>
+          <p:cNvPr id="45" name="Retângulo 44">
+            <a:extLst>
+              <a:ext uri="{FF2B5EF4-FFF2-40B4-BE49-F238E27FC236}">
+                <a16:creationId xmlns:a16="http://schemas.microsoft.com/office/drawing/2014/main" id="{41869066-4A17-8F6A-E3EE-7F6B6BAB3C78}"/>
+              </a:ext>
+            </a:extLst>
+          </p:cNvPr>
+          <p:cNvSpPr/>
+          <p:nvPr/>
+        </p:nvSpPr>
+        <p:spPr>
+          <a:xfrm>
+            <a:off x="22255096" y="27774914"/>
+            <a:ext cx="936104" cy="279768"/>
+          </a:xfrm>
+          <a:prstGeom prst="rect">
+            <a:avLst/>
+          </a:prstGeom>
+          <a:solidFill>
+            <a:srgbClr val="EFEFEF"/>
+          </a:solidFill>
+          <a:ln>
+            <a:noFill/>
+          </a:ln>
+        </p:spPr>
+        <p:style>
+          <a:lnRef idx="2">
+            <a:schemeClr val="accent1">
+              <a:shade val="15000"/>
+            </a:schemeClr>
+          </a:lnRef>
+          <a:fillRef idx="1">
+            <a:schemeClr val="accent1"/>
+          </a:fillRef>
+          <a:effectRef idx="0">
+            <a:schemeClr val="accent1"/>
+          </a:effectRef>
+          <a:fontRef idx="minor">
+            <a:schemeClr val="lt1"/>
+          </a:fontRef>
+        </p:style>
+        <p:txBody>
+          <a:bodyPr rtlCol="0" anchor="ctr"/>
+          <a:lstStyle/>
+          <a:p>
+            <a:pPr algn="ctr"/>
+            <a:endParaRPr lang="pt-BR"/>
           </a:p>
         </p:txBody>
       </p:sp>
@@ -2355,6 +4056,24 @@
     <a:masterClrMapping/>
   </p:clrMapOvr>
 </p:sld>
+</file>
+
+<file path=ppt/tags/tag1.xml><?xml version="1.0" encoding="utf-8"?>
+<p:tagLst xmlns:a="http://schemas.openxmlformats.org/drawingml/2006/main" xmlns:r="http://schemas.openxmlformats.org/officeDocument/2006/relationships" xmlns:p="http://schemas.openxmlformats.org/presentationml/2006/main">
+  <p:tag name="THINKCELLUNDODONOTDELETE" val="0"/>
+</p:tagLst>
+</file>
+
+<file path=ppt/tags/tag2.xml><?xml version="1.0" encoding="utf-8"?>
+<p:tagLst xmlns:a="http://schemas.openxmlformats.org/drawingml/2006/main" xmlns:r="http://schemas.openxmlformats.org/officeDocument/2006/relationships" xmlns:p="http://schemas.openxmlformats.org/presentationml/2006/main">
+  <p:tag name="THINKCELLSHAPEDONOTDELETE" val="thinkcellActiveDocDoNotDelete"/>
+</p:tagLst>
+</file>
+
+<file path=ppt/tags/tag3.xml><?xml version="1.0" encoding="utf-8"?>
+<p:tagLst xmlns:a="http://schemas.openxmlformats.org/drawingml/2006/main" xmlns:r="http://schemas.openxmlformats.org/officeDocument/2006/relationships" xmlns:p="http://schemas.openxmlformats.org/presentationml/2006/main">
+  <p:tag name="THINKCELLSHAPEDONOTDELETE" val="thinkcellActiveDocDoNotDelete"/>
+</p:tagLst>
 </file>
 
 <file path=ppt/theme/theme1.xml><?xml version="1.0" encoding="utf-8"?>

</xml_diff>

<commit_message>
finalização banner, press release e link site
</commit_message>
<xml_diff>
--- a/05. Apresentações/s28-Poster.pptx
+++ b/05. Apresentações/s28-Poster.pptx
@@ -181,28 +181,6 @@
 </p188:authorLst>
 </file>
 
-<file path=ppt/comments/modernComment_100_0.xml><?xml version="1.0" encoding="utf-8"?>
-<p188:cmLst xmlns:a="http://schemas.openxmlformats.org/drawingml/2006/main" xmlns:r="http://schemas.openxmlformats.org/officeDocument/2006/relationships" xmlns:p188="http://schemas.microsoft.com/office/powerpoint/2018/8/main">
-  <p188:cm id="{8C561E76-CC59-47B7-80C5-800E7E9B113F}" authorId="{C3960FB0-0382-945A-B1A1-F693A89DD05E}" created="2023-12-05T14:12:49.330">
-    <ac:deMkLst xmlns:ac="http://schemas.microsoft.com/office/drawing/2013/main/command">
-      <pc:docMk xmlns:pc="http://schemas.microsoft.com/office/powerpoint/2013/main/command"/>
-      <pc:sldMk xmlns:pc="http://schemas.microsoft.com/office/powerpoint/2013/main/command" cId="0" sldId="256"/>
-      <ac:picMk id="40" creationId="{40EBEDAC-D1AB-2A00-9E8D-D07F293D91F0}"/>
-    </ac:deMkLst>
-    <p188:txBody>
-      <a:bodyPr/>
-      <a:lstStyle/>
-      <a:p>
-        <a:r>
-          <a:rPr lang="pt-BR"/>
-          <a:t>Alterar legenda top1-accuracy</a:t>
-        </a:r>
-      </a:p>
-    </p188:txBody>
-  </p188:cm>
-</p188:cmLst>
-</file>
-
 <file path=ppt/handoutMasters/handoutMaster1.xml><?xml version="1.0" encoding="utf-8"?>
 <p:handoutMaster xmlns:a="http://schemas.openxmlformats.org/drawingml/2006/main" xmlns:r="http://schemas.openxmlformats.org/officeDocument/2006/relationships" xmlns:p="http://schemas.openxmlformats.org/presentationml/2006/main">
   <p:cSld>
@@ -877,7 +855,7 @@
           <p:cNvPr id="6" name="think-cell data - do not delete" hidden="1">
             <a:extLst>
               <a:ext uri="{FF2B5EF4-FFF2-40B4-BE49-F238E27FC236}">
-                <a16:creationId xmlns:a16="http://schemas.microsoft.com/office/drawing/2014/main" xmlns="" id="{878BC8B4-4CB3-7D09-68BA-BDE98D824C32}"/>
+                <a16:creationId xmlns:a16="http://schemas.microsoft.com/office/drawing/2014/main" id="{878BC8B4-4CB3-7D09-68BA-BDE98D824C32}"/>
               </a:ext>
             </a:extLst>
           </p:cNvPr>
@@ -886,7 +864,7 @@
           </p:cNvGraphicFramePr>
           <p:nvPr userDrawn="1">
             <p:custDataLst>
-              <p:tags r:id="rId4"/>
+              <p:tags r:id="rId3"/>
             </p:custDataLst>
             <p:extLst>
               <p:ext uri="{D42A27DB-BD31-4B8C-83A1-F6EECF244321}">
@@ -903,12 +881,12 @@
           <a:graphicData uri="http://schemas.openxmlformats.org/presentationml/2006/ole">
             <mc:AlternateContent xmlns:mc="http://schemas.openxmlformats.org/markup-compatibility/2006">
               <mc:Choice xmlns:v="urn:schemas-microsoft-com:vml" Requires="v">
-                <p:oleObj spid="_x0000_s1028" name="Slide do think-cell" r:id="rId5" imgW="473" imgH="476" progId="TCLayout.ActiveDocument.1">
+                <p:oleObj name="Slide do think-cell" r:id="rId4" imgW="473" imgH="476" progId="TCLayout.ActiveDocument.1">
                   <p:embed/>
                 </p:oleObj>
               </mc:Choice>
               <mc:Fallback>
-                <p:oleObj name="Slide do think-cell" r:id="rId5" imgW="473" imgH="476" progId="TCLayout.ActiveDocument.1">
+                <p:oleObj name="Slide do think-cell" r:id="rId4" imgW="473" imgH="476" progId="TCLayout.ActiveDocument.1">
                   <p:embed/>
                   <p:pic>
                     <p:nvPicPr>
@@ -917,7 +895,7 @@
                       <p:nvPr/>
                     </p:nvPicPr>
                     <p:blipFill>
-                      <a:blip r:embed="rId6"/>
+                      <a:blip r:embed="rId5"/>
                       <a:stretch>
                         <a:fillRect/>
                       </a:stretch>
@@ -963,7 +941,7 @@
             <p:nvPr userDrawn="1"/>
           </p:nvPicPr>
           <p:blipFill>
-            <a:blip r:embed="rId7">
+            <a:blip r:embed="rId6">
               <a:extLst>
                 <a:ext uri="{28A0092B-C50C-407E-A947-70E740481C1C}">
                   <a14:useLocalDpi xmlns:a14="http://schemas.microsoft.com/office/drawing/2010/main" val="0"/>
@@ -1627,7 +1605,7 @@
           <p:cNvPr id="33" name="think-cell data - do not delete" hidden="1">
             <a:extLst>
               <a:ext uri="{FF2B5EF4-FFF2-40B4-BE49-F238E27FC236}">
-                <a16:creationId xmlns:a16="http://schemas.microsoft.com/office/drawing/2014/main" xmlns="" id="{F4ADA71E-0301-9F45-9578-945ECAFB2238}"/>
+                <a16:creationId xmlns:a16="http://schemas.microsoft.com/office/drawing/2014/main" id="{F4ADA71E-0301-9F45-9578-945ECAFB2238}"/>
               </a:ext>
             </a:extLst>
           </p:cNvPr>
@@ -1636,11 +1614,11 @@
           </p:cNvGraphicFramePr>
           <p:nvPr>
             <p:custDataLst>
-              <p:tags r:id="rId2"/>
+              <p:tags r:id="rId1"/>
             </p:custDataLst>
             <p:extLst>
               <p:ext uri="{D42A27DB-BD31-4B8C-83A1-F6EECF244321}">
-                <p14:modId xmlns:p14="http://schemas.microsoft.com/office/powerpoint/2010/main" val="583697147"/>
+                <p14:modId xmlns:p14="http://schemas.microsoft.com/office/powerpoint/2010/main" val="732397194"/>
               </p:ext>
             </p:extLst>
           </p:nvPr>
@@ -1653,12 +1631,12 @@
           <a:graphicData uri="http://schemas.openxmlformats.org/presentationml/2006/ole">
             <mc:AlternateContent xmlns:mc="http://schemas.openxmlformats.org/markup-compatibility/2006">
               <mc:Choice xmlns:v="urn:schemas-microsoft-com:vml" Requires="v">
-                <p:oleObj spid="_x0000_s2052" name="Slide do think-cell" r:id="rId5" imgW="473" imgH="476" progId="TCLayout.ActiveDocument.1">
+                <p:oleObj name="Slide do think-cell" r:id="rId4" imgW="473" imgH="476" progId="TCLayout.ActiveDocument.1">
                   <p:embed/>
                 </p:oleObj>
               </mc:Choice>
               <mc:Fallback>
-                <p:oleObj name="Slide do think-cell" r:id="rId5" imgW="473" imgH="476" progId="TCLayout.ActiveDocument.1">
+                <p:oleObj name="Slide do think-cell" r:id="rId4" imgW="473" imgH="476" progId="TCLayout.ActiveDocument.1">
                   <p:embed/>
                   <p:pic>
                     <p:nvPicPr>
@@ -1667,7 +1645,7 @@
                       <p:nvPr/>
                     </p:nvPicPr>
                     <p:blipFill>
-                      <a:blip r:embed="rId6"/>
+                      <a:blip r:embed="rId5"/>
                       <a:stretch>
                         <a:fillRect/>
                       </a:stretch>
@@ -1693,7 +1671,7 @@
           <p:cNvPr id="32" name="Retângulo 31">
             <a:extLst>
               <a:ext uri="{FF2B5EF4-FFF2-40B4-BE49-F238E27FC236}">
-                <a16:creationId xmlns:a16="http://schemas.microsoft.com/office/drawing/2014/main" xmlns="" id="{E73D3804-A502-B50D-E428-D17B75ECDEF7}"/>
+                <a16:creationId xmlns:a16="http://schemas.microsoft.com/office/drawing/2014/main" id="{E73D3804-A502-B50D-E428-D17B75ECDEF7}"/>
               </a:ext>
             </a:extLst>
           </p:cNvPr>
@@ -1896,7 +1874,7 @@
         </p:nvSpPr>
         <p:spPr>
           <a:xfrm>
-            <a:off x="1309664" y="7562256"/>
+            <a:off x="1309664" y="7826610"/>
             <a:ext cx="12025336" cy="846385"/>
           </a:xfrm>
           <a:prstGeom prst="rect">
@@ -2042,7 +2020,7 @@
           <p:cNvPr id="2" name="TextBox 13">
             <a:extLst>
               <a:ext uri="{FF2B5EF4-FFF2-40B4-BE49-F238E27FC236}">
-                <a16:creationId xmlns:a16="http://schemas.microsoft.com/office/drawing/2014/main" xmlns="" id="{25F21E3A-AF4C-AFD9-1219-BCA1539BB4F0}"/>
+                <a16:creationId xmlns:a16="http://schemas.microsoft.com/office/drawing/2014/main" id="{25F21E3A-AF4C-AFD9-1219-BCA1539BB4F0}"/>
               </a:ext>
             </a:extLst>
           </p:cNvPr>
@@ -2051,7 +2029,7 @@
         </p:nvSpPr>
         <p:spPr>
           <a:xfrm>
-            <a:off x="13520829" y="7562256"/>
+            <a:off x="13520829" y="7826610"/>
             <a:ext cx="12025336" cy="846385"/>
           </a:xfrm>
           <a:prstGeom prst="rect">
@@ -2200,7 +2178,7 @@
           <p:cNvPr id="6" name="TextBox 13">
             <a:extLst>
               <a:ext uri="{FF2B5EF4-FFF2-40B4-BE49-F238E27FC236}">
-                <a16:creationId xmlns:a16="http://schemas.microsoft.com/office/drawing/2014/main" xmlns="" id="{6C4B33FE-ABA4-CB0C-EB27-D69667741420}"/>
+                <a16:creationId xmlns:a16="http://schemas.microsoft.com/office/drawing/2014/main" id="{6C4B33FE-ABA4-CB0C-EB27-D69667741420}"/>
               </a:ext>
             </a:extLst>
           </p:cNvPr>
@@ -2209,7 +2187,7 @@
         </p:nvSpPr>
         <p:spPr>
           <a:xfrm>
-            <a:off x="1309664" y="16310398"/>
+            <a:off x="1309664" y="15471874"/>
             <a:ext cx="12025336" cy="846385"/>
           </a:xfrm>
           <a:prstGeom prst="rect">
@@ -2395,7 +2373,7 @@
           <p:cNvPr id="10" name="TextBox 13">
             <a:extLst>
               <a:ext uri="{FF2B5EF4-FFF2-40B4-BE49-F238E27FC236}">
-                <a16:creationId xmlns:a16="http://schemas.microsoft.com/office/drawing/2014/main" xmlns="" id="{EF097D8B-D9CD-4C4A-D7DD-162DA3DCA3CA}"/>
+                <a16:creationId xmlns:a16="http://schemas.microsoft.com/office/drawing/2014/main" id="{EF097D8B-D9CD-4C4A-D7DD-162DA3DCA3CA}"/>
               </a:ext>
             </a:extLst>
           </p:cNvPr>
@@ -2404,7 +2382,7 @@
         </p:nvSpPr>
         <p:spPr>
           <a:xfrm>
-            <a:off x="13520829" y="30820840"/>
+            <a:off x="13520829" y="31085194"/>
             <a:ext cx="12025336" cy="846385"/>
           </a:xfrm>
           <a:prstGeom prst="rect">
@@ -2550,7 +2528,7 @@
           <p:cNvPr id="11" name="CaixaDeTexto 10">
             <a:extLst>
               <a:ext uri="{FF2B5EF4-FFF2-40B4-BE49-F238E27FC236}">
-                <a16:creationId xmlns:a16="http://schemas.microsoft.com/office/drawing/2014/main" xmlns="" id="{4FF31683-3869-1A56-38BD-3A473824A6D7}"/>
+                <a16:creationId xmlns:a16="http://schemas.microsoft.com/office/drawing/2014/main" id="{4FF31683-3869-1A56-38BD-3A473824A6D7}"/>
               </a:ext>
             </a:extLst>
           </p:cNvPr>
@@ -2559,7 +2537,7 @@
         </p:nvSpPr>
         <p:spPr>
           <a:xfrm>
-            <a:off x="1279001" y="8612565"/>
+            <a:off x="1279001" y="8876919"/>
             <a:ext cx="12025312" cy="6370975"/>
           </a:xfrm>
           <a:prstGeom prst="rect">
@@ -2693,7 +2671,7 @@
           <p:cNvPr id="12" name="CaixaDeTexto 11">
             <a:extLst>
               <a:ext uri="{FF2B5EF4-FFF2-40B4-BE49-F238E27FC236}">
-                <a16:creationId xmlns:a16="http://schemas.microsoft.com/office/drawing/2014/main" xmlns="" id="{F5EFA2DB-79E7-7128-F584-0DAB3430093A}"/>
+                <a16:creationId xmlns:a16="http://schemas.microsoft.com/office/drawing/2014/main" id="{F5EFA2DB-79E7-7128-F584-0DAB3430093A}"/>
               </a:ext>
             </a:extLst>
           </p:cNvPr>
@@ -2702,7 +2680,7 @@
         </p:nvSpPr>
         <p:spPr>
           <a:xfrm>
-            <a:off x="1309689" y="17515826"/>
+            <a:off x="1309689" y="16646660"/>
             <a:ext cx="12025312" cy="12280285"/>
           </a:xfrm>
           <a:prstGeom prst="rect">
@@ -2893,6 +2871,9 @@
           <a:p>
             <a:r>
               <a:rPr lang="pt-BR" b="1" dirty="0">
+                <a:solidFill>
+                  <a:srgbClr val="6600FF"/>
+                </a:solidFill>
                 <a:latin typeface="Arial" panose="020B0604020202020204" pitchFamily="34" charset="0"/>
                 <a:ea typeface="Calibri" panose="020F0502020204030204" pitchFamily="34" charset="0"/>
                 <a:cs typeface="Arial" panose="020B0604020202020204" pitchFamily="34" charset="0"/>
@@ -2971,13 +2952,6 @@
               </a:rPr>
               <a:t>Existem atributos que desempenham maior impacto na predição da</a:t>
             </a:r>
-            <a:r>
-              <a:rPr lang="pt-BR" dirty="0">
-                <a:latin typeface="Arial" panose="020B0604020202020204" pitchFamily="34" charset="0"/>
-                <a:cs typeface="Arial" panose="020B0604020202020204" pitchFamily="34" charset="0"/>
-              </a:rPr>
-              <a:t/>
-            </a:r>
             <a:br>
               <a:rPr lang="pt-BR" dirty="0">
                 <a:latin typeface="Arial" panose="020B0604020202020204" pitchFamily="34" charset="0"/>
@@ -3005,7 +2979,7 @@
           <p:cNvPr id="13" name="CaixaDeTexto 12">
             <a:extLst>
               <a:ext uri="{FF2B5EF4-FFF2-40B4-BE49-F238E27FC236}">
-                <a16:creationId xmlns:a16="http://schemas.microsoft.com/office/drawing/2014/main" xmlns="" id="{3C0402FC-1B3C-3FE9-BC62-3B8C088DA97E}"/>
+                <a16:creationId xmlns:a16="http://schemas.microsoft.com/office/drawing/2014/main" id="{3C0402FC-1B3C-3FE9-BC62-3B8C088DA97E}"/>
               </a:ext>
             </a:extLst>
           </p:cNvPr>
@@ -3014,7 +2988,7 @@
         </p:nvSpPr>
         <p:spPr>
           <a:xfrm>
-            <a:off x="13527235" y="31859158"/>
+            <a:off x="13527235" y="32123512"/>
             <a:ext cx="12025312" cy="3416320"/>
           </a:xfrm>
           <a:prstGeom prst="rect">
@@ -3038,23 +3012,7 @@
                 <a:ea typeface="Calibri" panose="020F0502020204030204" pitchFamily="34" charset="0"/>
                 <a:cs typeface="Arial" panose="020B0604020202020204" pitchFamily="34" charset="0"/>
               </a:rPr>
-              <a:t>É possível predizer, a partir do conjunto de </a:t>
-            </a:r>
-            <a:r>
-              <a:rPr lang="pt-BR" dirty="0" err="1">
-                <a:latin typeface="Arial" panose="020B0604020202020204" pitchFamily="34" charset="0"/>
-                <a:ea typeface="Calibri" panose="020F0502020204030204" pitchFamily="34" charset="0"/>
-                <a:cs typeface="Arial" panose="020B0604020202020204" pitchFamily="34" charset="0"/>
-              </a:rPr>
-              <a:t>features</a:t>
-            </a:r>
-            <a:r>
-              <a:rPr lang="pt-BR" dirty="0">
-                <a:latin typeface="Arial" panose="020B0604020202020204" pitchFamily="34" charset="0"/>
-                <a:ea typeface="Calibri" panose="020F0502020204030204" pitchFamily="34" charset="0"/>
-                <a:cs typeface="Arial" panose="020B0604020202020204" pitchFamily="34" charset="0"/>
-              </a:rPr>
-              <a:t> selecionado, a causa de óbito de um falecido</a:t>
+              <a:t>É possível predizer, a partir do conjunto de atributos selecionado, a causa de óbito de um indivíduo</a:t>
             </a:r>
           </a:p>
           <a:p>
@@ -3079,7 +3037,7 @@
                 <a:ea typeface="Calibri" panose="020F0502020204030204" pitchFamily="34" charset="0"/>
                 <a:cs typeface="Arial" panose="020B0604020202020204" pitchFamily="34" charset="0"/>
               </a:rPr>
-              <a:t>Os modelos desenvolvidos são capazes de generalizar os resultados obtidos para amostras aos casos de treinamento e teste, inclusive pode ser generalizado para outros estados da federação com características bem diferentes</a:t>
+              <a:t>Os modelos desenvolvidos e treinados para o estado de SP apresentaram uma generalização positiva e promissora. Interessantemente, os modelos generalizaram para outros estados da federação com padrões bem diferentes.</a:t>
             </a:r>
           </a:p>
           <a:p>
@@ -3104,33 +3062,53 @@
                 <a:ea typeface="Calibri" panose="020F0502020204030204" pitchFamily="34" charset="0"/>
                 <a:cs typeface="Arial" panose="020B0604020202020204" pitchFamily="34" charset="0"/>
               </a:rPr>
-              <a:t>O modelo gerado possui resultado semelhante para apenas 10% das </a:t>
-            </a:r>
-            <a:r>
-              <a:rPr lang="pt-BR" dirty="0" err="1">
-                <a:latin typeface="Arial" panose="020B0604020202020204" pitchFamily="34" charset="0"/>
-                <a:ea typeface="Calibri" panose="020F0502020204030204" pitchFamily="34" charset="0"/>
-                <a:cs typeface="Arial" panose="020B0604020202020204" pitchFamily="34" charset="0"/>
-              </a:rPr>
-              <a:t>features</a:t>
-            </a:r>
-            <a:r>
-              <a:rPr lang="pt-BR" dirty="0">
-                <a:latin typeface="Arial" panose="020B0604020202020204" pitchFamily="34" charset="0"/>
-                <a:ea typeface="Calibri" panose="020F0502020204030204" pitchFamily="34" charset="0"/>
-                <a:cs typeface="Arial" panose="020B0604020202020204" pitchFamily="34" charset="0"/>
-              </a:rPr>
-              <a:t> e a precisão acima desse valor não cresce de maneira relevante</a:t>
+              <a:t>O modelo gerado possui resultado semelhante quando considera-se apenas 10% dos atributos e a precisão acima desse valor não cresce de maneira relevante</a:t>
             </a:r>
           </a:p>
         </p:txBody>
       </p:sp>
       <p:pic>
         <p:nvPicPr>
-          <p:cNvPr id="17" name="Imagem 16" descr="Gráfico, Gráfico de linhas&#10;&#10;Descrição gerada automaticamente">
+          <p:cNvPr id="23" name="Imagem 22" descr="Gráfico&#10;&#10;Descrição gerada automaticamente">
             <a:extLst>
               <a:ext uri="{FF2B5EF4-FFF2-40B4-BE49-F238E27FC236}">
-                <a16:creationId xmlns:a16="http://schemas.microsoft.com/office/drawing/2014/main" xmlns="" id="{73E99811-BAC5-D321-9C38-4DC2F9BD5766}"/>
+                <a16:creationId xmlns:a16="http://schemas.microsoft.com/office/drawing/2014/main" id="{53C6B76B-21C5-92AB-8AD3-0C51F6222BD2}"/>
+              </a:ext>
+            </a:extLst>
+          </p:cNvPr>
+          <p:cNvPicPr>
+            <a:picLocks noChangeAspect="1"/>
+          </p:cNvPicPr>
+          <p:nvPr/>
+        </p:nvPicPr>
+        <p:blipFill>
+          <a:blip r:embed="rId6" cstate="print">
+            <a:extLst>
+              <a:ext uri="{28A0092B-C50C-407E-A947-70E740481C1C}">
+                <a14:useLocalDpi xmlns:a14="http://schemas.microsoft.com/office/drawing/2010/main" val="0"/>
+              </a:ext>
+            </a:extLst>
+          </a:blip>
+          <a:stretch>
+            <a:fillRect/>
+          </a:stretch>
+        </p:blipFill>
+        <p:spPr>
+          <a:xfrm>
+            <a:off x="14238991" y="21006804"/>
+            <a:ext cx="10800160" cy="6480096"/>
+          </a:xfrm>
+          <a:prstGeom prst="rect">
+            <a:avLst/>
+          </a:prstGeom>
+        </p:spPr>
+      </p:pic>
+      <p:pic>
+        <p:nvPicPr>
+          <p:cNvPr id="27" name="Imagem 26" descr="Gráfico, Gráfico de linhas&#10;&#10;Descrição gerada automaticamente">
+            <a:extLst>
+              <a:ext uri="{FF2B5EF4-FFF2-40B4-BE49-F238E27FC236}">
+                <a16:creationId xmlns:a16="http://schemas.microsoft.com/office/drawing/2014/main" id="{F1FFC008-ECFE-1D87-8078-0476AA19FA4F}"/>
               </a:ext>
             </a:extLst>
           </p:cNvPr>
@@ -3153,152 +3131,8 @@
         </p:blipFill>
         <p:spPr>
           <a:xfrm>
-            <a:off x="19771275" y="14957879"/>
-            <a:ext cx="6000000" cy="3600000"/>
-          </a:xfrm>
-          <a:prstGeom prst="rect">
-            <a:avLst/>
-          </a:prstGeom>
-        </p:spPr>
-      </p:pic>
-      <p:pic>
-        <p:nvPicPr>
-          <p:cNvPr id="19" name="Imagem 18" descr="Gráfico, Gráfico de linhas&#10;&#10;Descrição gerada automaticamente">
-            <a:extLst>
-              <a:ext uri="{FF2B5EF4-FFF2-40B4-BE49-F238E27FC236}">
-                <a16:creationId xmlns:a16="http://schemas.microsoft.com/office/drawing/2014/main" xmlns="" id="{69E8D6CA-43E9-6DF4-872F-6D0A48212D53}"/>
-              </a:ext>
-            </a:extLst>
-          </p:cNvPr>
-          <p:cNvPicPr>
-            <a:picLocks noChangeAspect="1"/>
-          </p:cNvPicPr>
-          <p:nvPr/>
-        </p:nvPicPr>
-        <p:blipFill>
-          <a:blip r:embed="rId8" cstate="print">
-            <a:extLst>
-              <a:ext uri="{28A0092B-C50C-407E-A947-70E740481C1C}">
-                <a14:useLocalDpi xmlns:a14="http://schemas.microsoft.com/office/drawing/2010/main" val="0"/>
-              </a:ext>
-            </a:extLst>
-          </a:blip>
-          <a:stretch>
-            <a:fillRect/>
-          </a:stretch>
-        </p:blipFill>
-        <p:spPr>
-          <a:xfrm>
-            <a:off x="13639071" y="14957879"/>
-            <a:ext cx="6000000" cy="3600000"/>
-          </a:xfrm>
-          <a:prstGeom prst="rect">
-            <a:avLst/>
-          </a:prstGeom>
-        </p:spPr>
-      </p:pic>
-      <p:pic>
-        <p:nvPicPr>
-          <p:cNvPr id="23" name="Imagem 22" descr="Gráfico&#10;&#10;Descrição gerada automaticamente">
-            <a:extLst>
-              <a:ext uri="{FF2B5EF4-FFF2-40B4-BE49-F238E27FC236}">
-                <a16:creationId xmlns:a16="http://schemas.microsoft.com/office/drawing/2014/main" xmlns="" id="{53C6B76B-21C5-92AB-8AD3-0C51F6222BD2}"/>
-              </a:ext>
-            </a:extLst>
-          </p:cNvPr>
-          <p:cNvPicPr>
-            <a:picLocks noChangeAspect="1"/>
-          </p:cNvPicPr>
-          <p:nvPr/>
-        </p:nvPicPr>
-        <p:blipFill>
-          <a:blip r:embed="rId9" cstate="print">
-            <a:extLst>
-              <a:ext uri="{28A0092B-C50C-407E-A947-70E740481C1C}">
-                <a14:useLocalDpi xmlns:a14="http://schemas.microsoft.com/office/drawing/2010/main" val="0"/>
-              </a:ext>
-            </a:extLst>
-          </a:blip>
-          <a:stretch>
-            <a:fillRect/>
-          </a:stretch>
-        </p:blipFill>
-        <p:spPr>
-          <a:xfrm>
-            <a:off x="14238991" y="20742450"/>
-            <a:ext cx="10800160" cy="6480096"/>
-          </a:xfrm>
-          <a:prstGeom prst="rect">
-            <a:avLst/>
-          </a:prstGeom>
-        </p:spPr>
-      </p:pic>
-      <p:pic>
-        <p:nvPicPr>
-          <p:cNvPr id="25" name="Imagem 24" descr="Gráfico, Gráfico de linhas&#10;&#10;Descrição gerada automaticamente">
-            <a:extLst>
-              <a:ext uri="{FF2B5EF4-FFF2-40B4-BE49-F238E27FC236}">
-                <a16:creationId xmlns:a16="http://schemas.microsoft.com/office/drawing/2014/main" xmlns="" id="{08E77E0D-F6C0-6678-6A01-41AAD7738359}"/>
-              </a:ext>
-            </a:extLst>
-          </p:cNvPr>
-          <p:cNvPicPr>
-            <a:picLocks noChangeAspect="1"/>
-          </p:cNvPicPr>
-          <p:nvPr/>
-        </p:nvPicPr>
-        <p:blipFill>
-          <a:blip r:embed="rId10" cstate="print">
-            <a:extLst>
-              <a:ext uri="{28A0092B-C50C-407E-A947-70E740481C1C}">
-                <a14:useLocalDpi xmlns:a14="http://schemas.microsoft.com/office/drawing/2010/main" val="0"/>
-              </a:ext>
-            </a:extLst>
-          </a:blip>
-          <a:stretch>
-            <a:fillRect/>
-          </a:stretch>
-        </p:blipFill>
-        <p:spPr>
-          <a:xfrm>
-            <a:off x="19807072" y="10030193"/>
-            <a:ext cx="6000000" cy="3600000"/>
-          </a:xfrm>
-          <a:prstGeom prst="rect">
-            <a:avLst/>
-          </a:prstGeom>
-        </p:spPr>
-      </p:pic>
-      <p:pic>
-        <p:nvPicPr>
-          <p:cNvPr id="27" name="Imagem 26" descr="Gráfico, Gráfico de linhas&#10;&#10;Descrição gerada automaticamente">
-            <a:extLst>
-              <a:ext uri="{FF2B5EF4-FFF2-40B4-BE49-F238E27FC236}">
-                <a16:creationId xmlns:a16="http://schemas.microsoft.com/office/drawing/2014/main" xmlns="" id="{F1FFC008-ECFE-1D87-8078-0476AA19FA4F}"/>
-              </a:ext>
-            </a:extLst>
-          </p:cNvPr>
-          <p:cNvPicPr>
-            <a:picLocks noChangeAspect="1"/>
-          </p:cNvPicPr>
-          <p:nvPr/>
-        </p:nvPicPr>
-        <p:blipFill>
-          <a:blip r:embed="rId11" cstate="print">
-            <a:extLst>
-              <a:ext uri="{28A0092B-C50C-407E-A947-70E740481C1C}">
-                <a14:useLocalDpi xmlns:a14="http://schemas.microsoft.com/office/drawing/2010/main" val="0"/>
-              </a:ext>
-            </a:extLst>
-          </a:blip>
-          <a:stretch>
-            <a:fillRect/>
-          </a:stretch>
-        </p:blipFill>
-        <p:spPr>
-          <a:xfrm>
-            <a:off x="13807072" y="10030193"/>
-            <a:ext cx="6000000" cy="3600000"/>
+            <a:off x="13527235" y="9947315"/>
+            <a:ext cx="6480000" cy="3888000"/>
           </a:xfrm>
           <a:prstGeom prst="rect">
             <a:avLst/>
@@ -3310,7 +3144,7 @@
           <p:cNvPr id="30" name="Text Box 10">
             <a:extLst>
               <a:ext uri="{FF2B5EF4-FFF2-40B4-BE49-F238E27FC236}">
-                <a16:creationId xmlns:a16="http://schemas.microsoft.com/office/drawing/2014/main" xmlns="" id="{8D7792C4-0E93-46D8-2F7C-16A124EEBD87}"/>
+                <a16:creationId xmlns:a16="http://schemas.microsoft.com/office/drawing/2014/main" id="{8D7792C4-0E93-46D8-2F7C-16A124EEBD87}"/>
               </a:ext>
             </a:extLst>
           </p:cNvPr>
@@ -3446,7 +3280,7 @@
           <p:cNvPr id="34" name="TextBox 13">
             <a:extLst>
               <a:ext uri="{FF2B5EF4-FFF2-40B4-BE49-F238E27FC236}">
-                <a16:creationId xmlns:a16="http://schemas.microsoft.com/office/drawing/2014/main" xmlns="" id="{EEC01FD8-22E4-566F-88AB-58A35B8959F7}"/>
+                <a16:creationId xmlns:a16="http://schemas.microsoft.com/office/drawing/2014/main" id="{EEC01FD8-22E4-566F-88AB-58A35B8959F7}"/>
               </a:ext>
             </a:extLst>
           </p:cNvPr>
@@ -3589,7 +3423,7 @@
           <p:cNvPr id="36" name="CaixaDeTexto 35">
             <a:extLst>
               <a:ext uri="{FF2B5EF4-FFF2-40B4-BE49-F238E27FC236}">
-                <a16:creationId xmlns:a16="http://schemas.microsoft.com/office/drawing/2014/main" xmlns="" id="{CE9DEEDE-9080-216B-A503-F5AA4F00EB65}"/>
+                <a16:creationId xmlns:a16="http://schemas.microsoft.com/office/drawing/2014/main" id="{CE9DEEDE-9080-216B-A503-F5AA4F00EB65}"/>
               </a:ext>
             </a:extLst>
           </p:cNvPr>
@@ -3598,7 +3432,7 @@
         </p:nvSpPr>
         <p:spPr>
           <a:xfrm>
-            <a:off x="13616071" y="8921497"/>
+            <a:off x="13616071" y="8876919"/>
             <a:ext cx="12025312" cy="830997"/>
           </a:xfrm>
           <a:prstGeom prst="rect">
@@ -3677,7 +3511,7 @@
           <p:cNvPr id="37" name="TextBox 13">
             <a:extLst>
               <a:ext uri="{FF2B5EF4-FFF2-40B4-BE49-F238E27FC236}">
-                <a16:creationId xmlns:a16="http://schemas.microsoft.com/office/drawing/2014/main" xmlns="" id="{1E1CC1FC-CF58-B76D-D811-8A3C71EB3E72}"/>
+                <a16:creationId xmlns:a16="http://schemas.microsoft.com/office/drawing/2014/main" id="{1E1CC1FC-CF58-B76D-D811-8A3C71EB3E72}"/>
               </a:ext>
             </a:extLst>
           </p:cNvPr>
@@ -3686,7 +3520,7 @@
         </p:nvSpPr>
         <p:spPr>
           <a:xfrm>
-            <a:off x="1309664" y="30791655"/>
+            <a:off x="1309664" y="29081348"/>
             <a:ext cx="12025336" cy="846385"/>
           </a:xfrm>
           <a:prstGeom prst="rect">
@@ -3835,7 +3669,7 @@
           <p:cNvPr id="38" name="CaixaDeTexto 37">
             <a:extLst>
               <a:ext uri="{FF2B5EF4-FFF2-40B4-BE49-F238E27FC236}">
-                <a16:creationId xmlns:a16="http://schemas.microsoft.com/office/drawing/2014/main" xmlns="" id="{7A8EEA5F-3EBA-C486-6B8D-49E85CEDC90E}"/>
+                <a16:creationId xmlns:a16="http://schemas.microsoft.com/office/drawing/2014/main" id="{7A8EEA5F-3EBA-C486-6B8D-49E85CEDC90E}"/>
               </a:ext>
             </a:extLst>
           </p:cNvPr>
@@ -3844,8 +3678,8 @@
         </p:nvSpPr>
         <p:spPr>
           <a:xfrm>
-            <a:off x="1250362" y="32108250"/>
-            <a:ext cx="6041296" cy="2677656"/>
+            <a:off x="1250363" y="30299896"/>
+            <a:ext cx="3659702" cy="4893647"/>
           </a:xfrm>
           <a:prstGeom prst="rect">
             <a:avLst/>
@@ -3911,48 +3745,12 @@
           </a:p>
         </p:txBody>
       </p:sp>
-      <p:pic>
-        <p:nvPicPr>
-          <p:cNvPr id="40" name="Imagem 39" descr="Gráfico, Gráfico de linhas&#10;&#10;Descrição gerada automaticamente">
-            <a:extLst>
-              <a:ext uri="{FF2B5EF4-FFF2-40B4-BE49-F238E27FC236}">
-                <a16:creationId xmlns:a16="http://schemas.microsoft.com/office/drawing/2014/main" xmlns="" id="{40EBEDAC-D1AB-2A00-9E8D-D07F293D91F0}"/>
-              </a:ext>
-            </a:extLst>
-          </p:cNvPr>
-          <p:cNvPicPr>
-            <a:picLocks noChangeAspect="1"/>
-          </p:cNvPicPr>
-          <p:nvPr/>
-        </p:nvPicPr>
-        <p:blipFill>
-          <a:blip r:embed="rId12" cstate="print">
-            <a:extLst>
-              <a:ext uri="{28A0092B-C50C-407E-A947-70E740481C1C}">
-                <a14:useLocalDpi xmlns:a14="http://schemas.microsoft.com/office/drawing/2010/main" val="0"/>
-              </a:ext>
-            </a:extLst>
-          </a:blip>
-          <a:stretch>
-            <a:fillRect/>
-          </a:stretch>
-        </p:blipFill>
-        <p:spPr>
-          <a:xfrm>
-            <a:off x="7291657" y="31966441"/>
-            <a:ext cx="6000001" cy="3600000"/>
-          </a:xfrm>
-          <a:prstGeom prst="rect">
-            <a:avLst/>
-          </a:prstGeom>
-        </p:spPr>
-      </p:pic>
       <p:sp>
         <p:nvSpPr>
           <p:cNvPr id="41" name="CaixaDeTexto 40">
             <a:extLst>
               <a:ext uri="{FF2B5EF4-FFF2-40B4-BE49-F238E27FC236}">
-                <a16:creationId xmlns:a16="http://schemas.microsoft.com/office/drawing/2014/main" xmlns="" id="{166F6A2F-1F11-E619-A99F-545E7B915E5F}"/>
+                <a16:creationId xmlns:a16="http://schemas.microsoft.com/office/drawing/2014/main" id="{166F6A2F-1F11-E619-A99F-545E7B915E5F}"/>
               </a:ext>
             </a:extLst>
           </p:cNvPr>
@@ -3961,7 +3759,7 @@
         </p:nvSpPr>
         <p:spPr>
           <a:xfrm>
-            <a:off x="13616071" y="13836569"/>
+            <a:off x="13616071" y="14100923"/>
             <a:ext cx="12025312" cy="1200329"/>
           </a:xfrm>
           <a:prstGeom prst="rect">
@@ -3985,39 +3783,7 @@
                 <a:ea typeface="Calibri" panose="020F0502020204030204" pitchFamily="34" charset="0"/>
                 <a:cs typeface="Arial" panose="020B0604020202020204" pitchFamily="34" charset="0"/>
               </a:rPr>
-              <a:t>Seleção de </a:t>
-            </a:r>
-            <a:r>
-              <a:rPr lang="pt-BR" i="1" dirty="0" err="1">
-                <a:latin typeface="Arial" panose="020B0604020202020204" pitchFamily="34" charset="0"/>
-                <a:ea typeface="Calibri" panose="020F0502020204030204" pitchFamily="34" charset="0"/>
-                <a:cs typeface="Arial" panose="020B0604020202020204" pitchFamily="34" charset="0"/>
-              </a:rPr>
-              <a:t>features</a:t>
-            </a:r>
-            <a:r>
-              <a:rPr lang="pt-BR" dirty="0">
-                <a:latin typeface="Arial" panose="020B0604020202020204" pitchFamily="34" charset="0"/>
-                <a:ea typeface="Calibri" panose="020F0502020204030204" pitchFamily="34" charset="0"/>
-                <a:cs typeface="Arial" panose="020B0604020202020204" pitchFamily="34" charset="0"/>
-              </a:rPr>
-              <a:t>: a precisão e a precisão top-3 varia muito pouco com o aumento  da porcentagem das </a:t>
-            </a:r>
-            <a:r>
-              <a:rPr lang="pt-BR" dirty="0" err="1">
-                <a:latin typeface="Arial" panose="020B0604020202020204" pitchFamily="34" charset="0"/>
-                <a:ea typeface="Calibri" panose="020F0502020204030204" pitchFamily="34" charset="0"/>
-                <a:cs typeface="Arial" panose="020B0604020202020204" pitchFamily="34" charset="0"/>
-              </a:rPr>
-              <a:t>features</a:t>
-            </a:r>
-            <a:r>
-              <a:rPr lang="pt-BR" dirty="0">
-                <a:latin typeface="Arial" panose="020B0604020202020204" pitchFamily="34" charset="0"/>
-                <a:ea typeface="Calibri" panose="020F0502020204030204" pitchFamily="34" charset="0"/>
-                <a:cs typeface="Arial" panose="020B0604020202020204" pitchFamily="34" charset="0"/>
-              </a:rPr>
-              <a:t> selecionadas  </a:t>
+              <a:t>Seleção de atributos: a precisão e a precisão top-3 varia muito pouco com o aumento da porcentagem dos atributos selecionados  </a:t>
             </a:r>
             <a:r>
               <a:rPr lang="pt-BR" dirty="0">
@@ -4038,7 +3804,7 @@
           <p:cNvPr id="42" name="CaixaDeTexto 41">
             <a:extLst>
               <a:ext uri="{FF2B5EF4-FFF2-40B4-BE49-F238E27FC236}">
-                <a16:creationId xmlns:a16="http://schemas.microsoft.com/office/drawing/2014/main" xmlns="" id="{465CF1E5-C8B7-5502-F604-C4D0581B1CE3}"/>
+                <a16:creationId xmlns:a16="http://schemas.microsoft.com/office/drawing/2014/main" id="{465CF1E5-C8B7-5502-F604-C4D0581B1CE3}"/>
               </a:ext>
             </a:extLst>
           </p:cNvPr>
@@ -4047,7 +3813,7 @@
         </p:nvSpPr>
         <p:spPr>
           <a:xfrm>
-            <a:off x="13616071" y="19050000"/>
+            <a:off x="13616071" y="19569797"/>
             <a:ext cx="12025312" cy="1569660"/>
           </a:xfrm>
           <a:prstGeom prst="rect">
@@ -4097,7 +3863,7 @@
           <p:cNvPr id="45" name="Retângulo 44">
             <a:extLst>
               <a:ext uri="{FF2B5EF4-FFF2-40B4-BE49-F238E27FC236}">
-                <a16:creationId xmlns:a16="http://schemas.microsoft.com/office/drawing/2014/main" xmlns="" id="{41869066-4A17-8F6A-E3EE-7F6B6BAB3C78}"/>
+                <a16:creationId xmlns:a16="http://schemas.microsoft.com/office/drawing/2014/main" id="{41869066-4A17-8F6A-E3EE-7F6B6BAB3C78}"/>
               </a:ext>
             </a:extLst>
           </p:cNvPr>
@@ -4106,7 +3872,7 @@
         </p:nvSpPr>
         <p:spPr>
           <a:xfrm>
-            <a:off x="22255096" y="27774914"/>
+            <a:off x="22255096" y="28039268"/>
             <a:ext cx="936104" cy="279768"/>
           </a:xfrm>
           <a:prstGeom prst="rect">
@@ -4149,7 +3915,7 @@
           <p:cNvPr id="4" name="Tabela 3">
             <a:extLst>
               <a:ext uri="{FF2B5EF4-FFF2-40B4-BE49-F238E27FC236}">
-                <a16:creationId xmlns:a16="http://schemas.microsoft.com/office/drawing/2014/main" xmlns="" id="{08492482-B338-A915-1C62-517CAB5133D4}"/>
+                <a16:creationId xmlns:a16="http://schemas.microsoft.com/office/drawing/2014/main" id="{08492482-B338-A915-1C62-517CAB5133D4}"/>
               </a:ext>
             </a:extLst>
           </p:cNvPr>
@@ -4159,13 +3925,13 @@
           <p:nvPr>
             <p:extLst>
               <p:ext uri="{D42A27DB-BD31-4B8C-83A1-F6EECF244321}">
-                <p14:modId xmlns:p14="http://schemas.microsoft.com/office/powerpoint/2010/main" val="4069102588"/>
+                <p14:modId xmlns:p14="http://schemas.microsoft.com/office/powerpoint/2010/main" val="1384175284"/>
               </p:ext>
             </p:extLst>
           </p:nvPr>
         </p:nvGraphicFramePr>
         <p:xfrm>
-          <a:off x="15406839" y="27298872"/>
+          <a:off x="15406839" y="27563226"/>
           <a:ext cx="8253315" cy="3064320"/>
         </p:xfrm>
         <a:graphic>
@@ -4178,21 +3944,21 @@
                 <a:gridCol w="2751105">
                   <a:extLst>
                     <a:ext uri="{9D8B030D-6E8A-4147-A177-3AD203B41FA5}">
-                      <a16:colId xmlns:a16="http://schemas.microsoft.com/office/drawing/2014/main" xmlns="" val="260880667"/>
+                      <a16:colId xmlns:a16="http://schemas.microsoft.com/office/drawing/2014/main" val="260880667"/>
                     </a:ext>
                   </a:extLst>
                 </a:gridCol>
                 <a:gridCol w="2751105">
                   <a:extLst>
                     <a:ext uri="{9D8B030D-6E8A-4147-A177-3AD203B41FA5}">
-                      <a16:colId xmlns:a16="http://schemas.microsoft.com/office/drawing/2014/main" xmlns="" val="3240914268"/>
+                      <a16:colId xmlns:a16="http://schemas.microsoft.com/office/drawing/2014/main" val="3240914268"/>
                     </a:ext>
                   </a:extLst>
                 </a:gridCol>
                 <a:gridCol w="2751105">
                   <a:extLst>
                     <a:ext uri="{9D8B030D-6E8A-4147-A177-3AD203B41FA5}">
-                      <a16:colId xmlns:a16="http://schemas.microsoft.com/office/drawing/2014/main" xmlns="" val="1480852889"/>
+                      <a16:colId xmlns:a16="http://schemas.microsoft.com/office/drawing/2014/main" val="1480852889"/>
                     </a:ext>
                   </a:extLst>
                 </a:gridCol>
@@ -4249,7 +4015,7 @@
                           <a:latin typeface="Arial" panose="020B0604020202020204" pitchFamily="34" charset="0"/>
                           <a:cs typeface="Arial" panose="020B0604020202020204" pitchFamily="34" charset="0"/>
                         </a:rPr>
-                        <a:t>Top-1 </a:t>
+                        <a:t>(Top-1) </a:t>
                       </a:r>
                       <a:r>
                         <a:rPr lang="pt-BR" sz="2400" b="0" dirty="0" err="1">
@@ -4348,7 +4114,7 @@
                 </a:tc>
                 <a:extLst>
                   <a:ext uri="{0D108BD9-81ED-4DB2-BD59-A6C34878D82A}">
-                    <a16:rowId xmlns:a16="http://schemas.microsoft.com/office/drawing/2014/main" xmlns="" val="1810913433"/>
+                    <a16:rowId xmlns:a16="http://schemas.microsoft.com/office/drawing/2014/main" val="1810913433"/>
                   </a:ext>
                 </a:extLst>
               </a:tr>
@@ -4459,7 +4225,7 @@
                 </a:tc>
                 <a:extLst>
                   <a:ext uri="{0D108BD9-81ED-4DB2-BD59-A6C34878D82A}">
-                    <a16:rowId xmlns:a16="http://schemas.microsoft.com/office/drawing/2014/main" xmlns="" val="1606103834"/>
+                    <a16:rowId xmlns:a16="http://schemas.microsoft.com/office/drawing/2014/main" val="1606103834"/>
                   </a:ext>
                 </a:extLst>
               </a:tr>
@@ -4525,7 +4291,7 @@
                 </a:tc>
                 <a:extLst>
                   <a:ext uri="{0D108BD9-81ED-4DB2-BD59-A6C34878D82A}">
-                    <a16:rowId xmlns:a16="http://schemas.microsoft.com/office/drawing/2014/main" xmlns="" val="2508616337"/>
+                    <a16:rowId xmlns:a16="http://schemas.microsoft.com/office/drawing/2014/main" val="2508616337"/>
                   </a:ext>
                 </a:extLst>
               </a:tr>
@@ -4591,7 +4357,7 @@
                 </a:tc>
                 <a:extLst>
                   <a:ext uri="{0D108BD9-81ED-4DB2-BD59-A6C34878D82A}">
-                    <a16:rowId xmlns:a16="http://schemas.microsoft.com/office/drawing/2014/main" xmlns="" val="2772060745"/>
+                    <a16:rowId xmlns:a16="http://schemas.microsoft.com/office/drawing/2014/main" val="2772060745"/>
                   </a:ext>
                 </a:extLst>
               </a:tr>
@@ -4657,7 +4423,7 @@
                 </a:tc>
                 <a:extLst>
                   <a:ext uri="{0D108BD9-81ED-4DB2-BD59-A6C34878D82A}">
-                    <a16:rowId xmlns:a16="http://schemas.microsoft.com/office/drawing/2014/main" xmlns="" val="3458800131"/>
+                    <a16:rowId xmlns:a16="http://schemas.microsoft.com/office/drawing/2014/main" val="3458800131"/>
                   </a:ext>
                 </a:extLst>
               </a:tr>
@@ -4723,7 +4489,7 @@
                 </a:tc>
                 <a:extLst>
                   <a:ext uri="{0D108BD9-81ED-4DB2-BD59-A6C34878D82A}">
-                    <a16:rowId xmlns:a16="http://schemas.microsoft.com/office/drawing/2014/main" xmlns="" val="1315411820"/>
+                    <a16:rowId xmlns:a16="http://schemas.microsoft.com/office/drawing/2014/main" val="1315411820"/>
                   </a:ext>
                 </a:extLst>
               </a:tr>
@@ -4819,7 +4585,7 @@
                 </a:tc>
                 <a:extLst>
                   <a:ext uri="{0D108BD9-81ED-4DB2-BD59-A6C34878D82A}">
-                    <a16:rowId xmlns:a16="http://schemas.microsoft.com/office/drawing/2014/main" xmlns="" val="2779759940"/>
+                    <a16:rowId xmlns:a16="http://schemas.microsoft.com/office/drawing/2014/main" val="2779759940"/>
                   </a:ext>
                 </a:extLst>
               </a:tr>
@@ -4836,7 +4602,7 @@
           <p:nvPr/>
         </p:nvPicPr>
         <p:blipFill>
-          <a:blip r:embed="rId13" cstate="print">
+          <a:blip r:embed="rId8" cstate="print">
             <a:extLst>
               <a:ext uri="{28A0092B-C50C-407E-A947-70E740481C1C}">
                 <a14:useLocalDpi xmlns:a14="http://schemas.microsoft.com/office/drawing/2010/main" val="0"/>
@@ -4849,8 +4615,8 @@
         </p:blipFill>
         <p:spPr>
           <a:xfrm>
-            <a:off x="3067061" y="12970822"/>
-            <a:ext cx="9144019" cy="5486411"/>
+            <a:off x="4734690" y="30112460"/>
+            <a:ext cx="8569623" cy="5141773"/>
           </a:xfrm>
           <a:prstGeom prst="rect">
             <a:avLst/>
@@ -4866,7 +4632,7 @@
           <p:nvPr/>
         </p:nvPicPr>
         <p:blipFill>
-          <a:blip r:embed="rId14" cstate="print">
+          <a:blip r:embed="rId9" cstate="print">
             <a:extLst>
               <a:ext uri="{28A0092B-C50C-407E-A947-70E740481C1C}">
                 <a14:useLocalDpi xmlns:a14="http://schemas.microsoft.com/office/drawing/2010/main" val="0"/>
@@ -4879,8 +4645,8 @@
         </p:blipFill>
         <p:spPr>
           <a:xfrm>
-            <a:off x="13185000" y="9447031"/>
-            <a:ext cx="9144019" cy="5486411"/>
+            <a:off x="13527235" y="15487956"/>
+            <a:ext cx="6480000" cy="3888000"/>
           </a:xfrm>
           <a:prstGeom prst="rect">
             <a:avLst/>
@@ -4896,7 +4662,7 @@
           <p:nvPr/>
         </p:nvPicPr>
         <p:blipFill>
-          <a:blip r:embed="rId15" cstate="print">
+          <a:blip r:embed="rId10" cstate="print">
             <a:extLst>
               <a:ext uri="{28A0092B-C50C-407E-A947-70E740481C1C}">
                 <a14:useLocalDpi xmlns:a14="http://schemas.microsoft.com/office/drawing/2010/main" val="0"/>
@@ -4909,8 +4675,44 @@
         </p:blipFill>
         <p:spPr>
           <a:xfrm>
-            <a:off x="13223038" y="15268123"/>
-            <a:ext cx="9144019" cy="5486411"/>
+            <a:off x="19694273" y="15487956"/>
+            <a:ext cx="6480000" cy="3888000"/>
+          </a:xfrm>
+          <a:prstGeom prst="rect">
+            <a:avLst/>
+          </a:prstGeom>
+        </p:spPr>
+      </p:pic>
+      <p:pic>
+        <p:nvPicPr>
+          <p:cNvPr id="25" name="Imagem 24" descr="Gráfico, Gráfico de linhas&#10;&#10;Descrição gerada automaticamente">
+            <a:extLst>
+              <a:ext uri="{FF2B5EF4-FFF2-40B4-BE49-F238E27FC236}">
+                <a16:creationId xmlns:a16="http://schemas.microsoft.com/office/drawing/2014/main" id="{08E77E0D-F6C0-6678-6A01-41AAD7738359}"/>
+              </a:ext>
+            </a:extLst>
+          </p:cNvPr>
+          <p:cNvPicPr>
+            <a:picLocks noChangeAspect="1"/>
+          </p:cNvPicPr>
+          <p:nvPr/>
+        </p:nvPicPr>
+        <p:blipFill>
+          <a:blip r:embed="rId11" cstate="print">
+            <a:extLst>
+              <a:ext uri="{28A0092B-C50C-407E-A947-70E740481C1C}">
+                <a14:useLocalDpi xmlns:a14="http://schemas.microsoft.com/office/drawing/2010/main" val="0"/>
+              </a:ext>
+            </a:extLst>
+          </a:blip>
+          <a:stretch>
+            <a:fillRect/>
+          </a:stretch>
+        </p:blipFill>
+        <p:spPr>
+          <a:xfrm>
+            <a:off x="19694273" y="9947315"/>
+            <a:ext cx="6480000" cy="3888000"/>
           </a:xfrm>
           <a:prstGeom prst="rect">
             <a:avLst/>
@@ -4922,11 +4724,6 @@
   <p:clrMapOvr>
     <a:masterClrMapping/>
   </p:clrMapOvr>
-  <p:extLst mod="1">
-    <p:ext uri="{6950BFC3-D8DA-4A85-94F7-54DA5524770B}">
-      <p188:commentRel xmlns:p188="http://schemas.microsoft.com/office/powerpoint/2018/8/main" xmlns="" r:id="rId16"/>
-    </p:ext>
-  </p:extLst>
 </p:sld>
 </file>
 

</xml_diff>